<commit_message>
updated readmes, added web api
</commit_message>
<xml_diff>
--- a/Chapter 2. Python for Data Scientists/Module 0. Introduction to Data Science/Intro_to_Data_Science.pptx
+++ b/Chapter 2. Python for Data Scientists/Module 0. Introduction to Data Science/Intro_to_Data_Science.pptx
@@ -5,7 +5,7 @@
     <p:sldMasterId id="2147483751" r:id="rId1"/>
   </p:sldMasterIdLst>
   <p:notesMasterIdLst>
-    <p:notesMasterId r:id="rId11"/>
+    <p:notesMasterId r:id="rId13"/>
   </p:notesMasterIdLst>
   <p:sldIdLst>
     <p:sldId id="256" r:id="rId2"/>
@@ -17,6 +17,8 @@
     <p:sldId id="262" r:id="rId8"/>
     <p:sldId id="263" r:id="rId9"/>
     <p:sldId id="264" r:id="rId10"/>
+    <p:sldId id="266" r:id="rId11"/>
+    <p:sldId id="265" r:id="rId12"/>
   </p:sldIdLst>
   <p:sldSz cx="12192000" cy="6858000"/>
   <p:notesSz cx="6858000" cy="9144000"/>
@@ -115,6 +117,11 @@
       </a:defRPr>
     </a:lvl9pPr>
   </p:defaultTextStyle>
+  <p:extLst>
+    <p:ext uri="{EFAFB233-063F-42B5-8137-9DF3F51BA10A}">
+      <p15:sldGuideLst xmlns:p15="http://schemas.microsoft.com/office/powerpoint/2012/main"/>
+    </p:ext>
+  </p:extLst>
 </p:presentation>
 </file>
 
@@ -3107,6 +3114,753 @@
 </file>
 
 <file path=ppt/diagrams/colors5.xml><?xml version="1.0" encoding="utf-8"?>
+<dgm:colorsDef xmlns:dgm="http://schemas.openxmlformats.org/drawingml/2006/diagram" xmlns:a="http://schemas.openxmlformats.org/drawingml/2006/main" uniqueId="urn:microsoft.com/office/officeart/2005/8/colors/accent1_2">
+  <dgm:title val=""/>
+  <dgm:desc val=""/>
+  <dgm:catLst>
+    <dgm:cat type="accent1" pri="11200"/>
+  </dgm:catLst>
+  <dgm:styleLbl name="node0">
+    <dgm:fillClrLst meth="repeat">
+      <a:schemeClr val="accent1"/>
+    </dgm:fillClrLst>
+    <dgm:linClrLst meth="repeat">
+      <a:schemeClr val="lt1"/>
+    </dgm:linClrLst>
+    <dgm:effectClrLst/>
+    <dgm:txLinClrLst/>
+    <dgm:txFillClrLst/>
+    <dgm:txEffectClrLst/>
+  </dgm:styleLbl>
+  <dgm:styleLbl name="alignNode1">
+    <dgm:fillClrLst meth="repeat">
+      <a:schemeClr val="accent1"/>
+    </dgm:fillClrLst>
+    <dgm:linClrLst meth="repeat">
+      <a:schemeClr val="accent1"/>
+    </dgm:linClrLst>
+    <dgm:effectClrLst/>
+    <dgm:txLinClrLst/>
+    <dgm:txFillClrLst/>
+    <dgm:txEffectClrLst/>
+  </dgm:styleLbl>
+  <dgm:styleLbl name="node1">
+    <dgm:fillClrLst meth="repeat">
+      <a:schemeClr val="accent1"/>
+    </dgm:fillClrLst>
+    <dgm:linClrLst meth="repeat">
+      <a:schemeClr val="lt1"/>
+    </dgm:linClrLst>
+    <dgm:effectClrLst/>
+    <dgm:txLinClrLst/>
+    <dgm:txFillClrLst/>
+    <dgm:txEffectClrLst/>
+  </dgm:styleLbl>
+  <dgm:styleLbl name="lnNode1">
+    <dgm:fillClrLst meth="repeat">
+      <a:schemeClr val="accent1"/>
+    </dgm:fillClrLst>
+    <dgm:linClrLst meth="repeat">
+      <a:schemeClr val="lt1"/>
+    </dgm:linClrLst>
+    <dgm:effectClrLst/>
+    <dgm:txLinClrLst/>
+    <dgm:txFillClrLst/>
+    <dgm:txEffectClrLst/>
+  </dgm:styleLbl>
+  <dgm:styleLbl name="vennNode1">
+    <dgm:fillClrLst meth="repeat">
+      <a:schemeClr val="accent1">
+        <a:alpha val="50000"/>
+      </a:schemeClr>
+    </dgm:fillClrLst>
+    <dgm:linClrLst meth="repeat">
+      <a:schemeClr val="lt1"/>
+    </dgm:linClrLst>
+    <dgm:effectClrLst/>
+    <dgm:txLinClrLst/>
+    <dgm:txFillClrLst/>
+    <dgm:txEffectClrLst/>
+  </dgm:styleLbl>
+  <dgm:styleLbl name="node2">
+    <dgm:fillClrLst meth="repeat">
+      <a:schemeClr val="accent1"/>
+    </dgm:fillClrLst>
+    <dgm:linClrLst meth="repeat">
+      <a:schemeClr val="lt1"/>
+    </dgm:linClrLst>
+    <dgm:effectClrLst/>
+    <dgm:txLinClrLst/>
+    <dgm:txFillClrLst/>
+    <dgm:txEffectClrLst/>
+  </dgm:styleLbl>
+  <dgm:styleLbl name="node3">
+    <dgm:fillClrLst meth="repeat">
+      <a:schemeClr val="accent1"/>
+    </dgm:fillClrLst>
+    <dgm:linClrLst meth="repeat">
+      <a:schemeClr val="lt1"/>
+    </dgm:linClrLst>
+    <dgm:effectClrLst/>
+    <dgm:txLinClrLst/>
+    <dgm:txFillClrLst/>
+    <dgm:txEffectClrLst/>
+  </dgm:styleLbl>
+  <dgm:styleLbl name="node4">
+    <dgm:fillClrLst meth="repeat">
+      <a:schemeClr val="accent1"/>
+    </dgm:fillClrLst>
+    <dgm:linClrLst meth="repeat">
+      <a:schemeClr val="lt1"/>
+    </dgm:linClrLst>
+    <dgm:effectClrLst/>
+    <dgm:txLinClrLst/>
+    <dgm:txFillClrLst/>
+    <dgm:txEffectClrLst/>
+  </dgm:styleLbl>
+  <dgm:styleLbl name="fgImgPlace1">
+    <dgm:fillClrLst meth="repeat">
+      <a:schemeClr val="accent1">
+        <a:tint val="50000"/>
+      </a:schemeClr>
+    </dgm:fillClrLst>
+    <dgm:linClrLst meth="repeat">
+      <a:schemeClr val="lt1"/>
+    </dgm:linClrLst>
+    <dgm:effectClrLst/>
+    <dgm:txLinClrLst/>
+    <dgm:txFillClrLst meth="repeat">
+      <a:schemeClr val="lt1"/>
+    </dgm:txFillClrLst>
+    <dgm:txEffectClrLst/>
+  </dgm:styleLbl>
+  <dgm:styleLbl name="alignImgPlace1">
+    <dgm:fillClrLst meth="repeat">
+      <a:schemeClr val="accent1">
+        <a:tint val="50000"/>
+      </a:schemeClr>
+    </dgm:fillClrLst>
+    <dgm:linClrLst meth="repeat">
+      <a:schemeClr val="lt1"/>
+    </dgm:linClrLst>
+    <dgm:effectClrLst/>
+    <dgm:txLinClrLst/>
+    <dgm:txFillClrLst meth="repeat">
+      <a:schemeClr val="lt1"/>
+    </dgm:txFillClrLst>
+    <dgm:txEffectClrLst/>
+  </dgm:styleLbl>
+  <dgm:styleLbl name="bgImgPlace1">
+    <dgm:fillClrLst meth="repeat">
+      <a:schemeClr val="accent1">
+        <a:tint val="50000"/>
+      </a:schemeClr>
+    </dgm:fillClrLst>
+    <dgm:linClrLst meth="repeat">
+      <a:schemeClr val="lt1"/>
+    </dgm:linClrLst>
+    <dgm:effectClrLst/>
+    <dgm:txLinClrLst/>
+    <dgm:txFillClrLst meth="repeat">
+      <a:schemeClr val="lt1"/>
+    </dgm:txFillClrLst>
+    <dgm:txEffectClrLst/>
+  </dgm:styleLbl>
+  <dgm:styleLbl name="sibTrans2D1">
+    <dgm:fillClrLst meth="repeat">
+      <a:schemeClr val="accent1">
+        <a:tint val="60000"/>
+      </a:schemeClr>
+    </dgm:fillClrLst>
+    <dgm:linClrLst meth="repeat">
+      <a:schemeClr val="accent1">
+        <a:tint val="60000"/>
+      </a:schemeClr>
+    </dgm:linClrLst>
+    <dgm:effectClrLst/>
+    <dgm:txLinClrLst/>
+    <dgm:txFillClrLst/>
+    <dgm:txEffectClrLst/>
+  </dgm:styleLbl>
+  <dgm:styleLbl name="fgSibTrans2D1">
+    <dgm:fillClrLst meth="repeat">
+      <a:schemeClr val="accent1">
+        <a:tint val="60000"/>
+      </a:schemeClr>
+    </dgm:fillClrLst>
+    <dgm:linClrLst meth="repeat">
+      <a:schemeClr val="accent1">
+        <a:tint val="60000"/>
+      </a:schemeClr>
+    </dgm:linClrLst>
+    <dgm:effectClrLst/>
+    <dgm:txLinClrLst/>
+    <dgm:txFillClrLst/>
+    <dgm:txEffectClrLst/>
+  </dgm:styleLbl>
+  <dgm:styleLbl name="bgSibTrans2D1">
+    <dgm:fillClrLst meth="repeat">
+      <a:schemeClr val="accent1">
+        <a:tint val="60000"/>
+      </a:schemeClr>
+    </dgm:fillClrLst>
+    <dgm:linClrLst meth="repeat">
+      <a:schemeClr val="accent1">
+        <a:tint val="60000"/>
+      </a:schemeClr>
+    </dgm:linClrLst>
+    <dgm:effectClrLst/>
+    <dgm:txLinClrLst/>
+    <dgm:txFillClrLst/>
+    <dgm:txEffectClrLst/>
+  </dgm:styleLbl>
+  <dgm:styleLbl name="sibTrans1D1">
+    <dgm:fillClrLst meth="repeat">
+      <a:schemeClr val="accent1"/>
+    </dgm:fillClrLst>
+    <dgm:linClrLst meth="repeat">
+      <a:schemeClr val="accent1"/>
+    </dgm:linClrLst>
+    <dgm:effectClrLst/>
+    <dgm:txLinClrLst/>
+    <dgm:txFillClrLst meth="repeat">
+      <a:schemeClr val="tx1"/>
+    </dgm:txFillClrLst>
+    <dgm:txEffectClrLst/>
+  </dgm:styleLbl>
+  <dgm:styleLbl name="callout">
+    <dgm:fillClrLst meth="repeat">
+      <a:schemeClr val="accent1"/>
+    </dgm:fillClrLst>
+    <dgm:linClrLst meth="repeat">
+      <a:schemeClr val="accent1">
+        <a:tint val="50000"/>
+      </a:schemeClr>
+    </dgm:linClrLst>
+    <dgm:effectClrLst/>
+    <dgm:txLinClrLst/>
+    <dgm:txFillClrLst meth="repeat">
+      <a:schemeClr val="tx1"/>
+    </dgm:txFillClrLst>
+    <dgm:txEffectClrLst/>
+  </dgm:styleLbl>
+  <dgm:styleLbl name="asst0">
+    <dgm:fillClrLst meth="repeat">
+      <a:schemeClr val="accent1"/>
+    </dgm:fillClrLst>
+    <dgm:linClrLst meth="repeat">
+      <a:schemeClr val="lt1"/>
+    </dgm:linClrLst>
+    <dgm:effectClrLst/>
+    <dgm:txLinClrLst/>
+    <dgm:txFillClrLst/>
+    <dgm:txEffectClrLst/>
+  </dgm:styleLbl>
+  <dgm:styleLbl name="asst1">
+    <dgm:fillClrLst meth="repeat">
+      <a:schemeClr val="accent1"/>
+    </dgm:fillClrLst>
+    <dgm:linClrLst meth="repeat">
+      <a:schemeClr val="lt1"/>
+    </dgm:linClrLst>
+    <dgm:effectClrLst/>
+    <dgm:txLinClrLst/>
+    <dgm:txFillClrLst/>
+    <dgm:txEffectClrLst/>
+  </dgm:styleLbl>
+  <dgm:styleLbl name="asst2">
+    <dgm:fillClrLst meth="repeat">
+      <a:schemeClr val="accent1"/>
+    </dgm:fillClrLst>
+    <dgm:linClrLst meth="repeat">
+      <a:schemeClr val="lt1"/>
+    </dgm:linClrLst>
+    <dgm:effectClrLst/>
+    <dgm:txLinClrLst/>
+    <dgm:txFillClrLst/>
+    <dgm:txEffectClrLst/>
+  </dgm:styleLbl>
+  <dgm:styleLbl name="asst3">
+    <dgm:fillClrLst meth="repeat">
+      <a:schemeClr val="accent1"/>
+    </dgm:fillClrLst>
+    <dgm:linClrLst meth="repeat">
+      <a:schemeClr val="lt1"/>
+    </dgm:linClrLst>
+    <dgm:effectClrLst/>
+    <dgm:txLinClrLst/>
+    <dgm:txFillClrLst/>
+    <dgm:txEffectClrLst/>
+  </dgm:styleLbl>
+  <dgm:styleLbl name="asst4">
+    <dgm:fillClrLst meth="repeat">
+      <a:schemeClr val="accent1"/>
+    </dgm:fillClrLst>
+    <dgm:linClrLst meth="repeat">
+      <a:schemeClr val="lt1"/>
+    </dgm:linClrLst>
+    <dgm:effectClrLst/>
+    <dgm:txLinClrLst/>
+    <dgm:txFillClrLst/>
+    <dgm:txEffectClrLst/>
+  </dgm:styleLbl>
+  <dgm:styleLbl name="parChTrans2D1">
+    <dgm:fillClrLst meth="repeat">
+      <a:schemeClr val="accent1">
+        <a:tint val="60000"/>
+      </a:schemeClr>
+    </dgm:fillClrLst>
+    <dgm:linClrLst meth="repeat">
+      <a:schemeClr val="accent1">
+        <a:tint val="60000"/>
+      </a:schemeClr>
+    </dgm:linClrLst>
+    <dgm:effectClrLst/>
+    <dgm:txLinClrLst/>
+    <dgm:txFillClrLst meth="repeat">
+      <a:schemeClr val="lt1"/>
+    </dgm:txFillClrLst>
+    <dgm:txEffectClrLst/>
+  </dgm:styleLbl>
+  <dgm:styleLbl name="parChTrans2D2">
+    <dgm:fillClrLst meth="repeat">
+      <a:schemeClr val="accent1"/>
+    </dgm:fillClrLst>
+    <dgm:linClrLst meth="repeat">
+      <a:schemeClr val="accent1"/>
+    </dgm:linClrLst>
+    <dgm:effectClrLst/>
+    <dgm:txLinClrLst/>
+    <dgm:txFillClrLst meth="repeat">
+      <a:schemeClr val="lt1"/>
+    </dgm:txFillClrLst>
+    <dgm:txEffectClrLst/>
+  </dgm:styleLbl>
+  <dgm:styleLbl name="parChTrans2D3">
+    <dgm:fillClrLst meth="repeat">
+      <a:schemeClr val="accent1"/>
+    </dgm:fillClrLst>
+    <dgm:linClrLst meth="repeat">
+      <a:schemeClr val="accent1"/>
+    </dgm:linClrLst>
+    <dgm:effectClrLst/>
+    <dgm:txLinClrLst/>
+    <dgm:txFillClrLst meth="repeat">
+      <a:schemeClr val="lt1"/>
+    </dgm:txFillClrLst>
+    <dgm:txEffectClrLst/>
+  </dgm:styleLbl>
+  <dgm:styleLbl name="parChTrans2D4">
+    <dgm:fillClrLst meth="repeat">
+      <a:schemeClr val="accent1"/>
+    </dgm:fillClrLst>
+    <dgm:linClrLst meth="repeat">
+      <a:schemeClr val="accent1"/>
+    </dgm:linClrLst>
+    <dgm:effectClrLst/>
+    <dgm:txLinClrLst/>
+    <dgm:txFillClrLst meth="repeat">
+      <a:schemeClr val="lt1"/>
+    </dgm:txFillClrLst>
+    <dgm:txEffectClrLst/>
+  </dgm:styleLbl>
+  <dgm:styleLbl name="parChTrans1D1">
+    <dgm:fillClrLst meth="repeat">
+      <a:schemeClr val="accent1"/>
+    </dgm:fillClrLst>
+    <dgm:linClrLst meth="repeat">
+      <a:schemeClr val="accent1">
+        <a:shade val="60000"/>
+      </a:schemeClr>
+    </dgm:linClrLst>
+    <dgm:effectClrLst/>
+    <dgm:txLinClrLst/>
+    <dgm:txFillClrLst meth="repeat">
+      <a:schemeClr val="tx1"/>
+    </dgm:txFillClrLst>
+    <dgm:txEffectClrLst/>
+  </dgm:styleLbl>
+  <dgm:styleLbl name="parChTrans1D2">
+    <dgm:fillClrLst meth="repeat">
+      <a:schemeClr val="accent1"/>
+    </dgm:fillClrLst>
+    <dgm:linClrLst meth="repeat">
+      <a:schemeClr val="accent1">
+        <a:shade val="60000"/>
+      </a:schemeClr>
+    </dgm:linClrLst>
+    <dgm:effectClrLst/>
+    <dgm:txLinClrLst/>
+    <dgm:txFillClrLst meth="repeat">
+      <a:schemeClr val="tx1"/>
+    </dgm:txFillClrLst>
+    <dgm:txEffectClrLst/>
+  </dgm:styleLbl>
+  <dgm:styleLbl name="parChTrans1D3">
+    <dgm:fillClrLst meth="repeat">
+      <a:schemeClr val="accent1"/>
+    </dgm:fillClrLst>
+    <dgm:linClrLst meth="repeat">
+      <a:schemeClr val="accent1">
+        <a:shade val="80000"/>
+      </a:schemeClr>
+    </dgm:linClrLst>
+    <dgm:effectClrLst/>
+    <dgm:txLinClrLst/>
+    <dgm:txFillClrLst meth="repeat">
+      <a:schemeClr val="tx1"/>
+    </dgm:txFillClrLst>
+    <dgm:txEffectClrLst/>
+  </dgm:styleLbl>
+  <dgm:styleLbl name="parChTrans1D4">
+    <dgm:fillClrLst meth="repeat">
+      <a:schemeClr val="accent1"/>
+    </dgm:fillClrLst>
+    <dgm:linClrLst meth="repeat">
+      <a:schemeClr val="accent1">
+        <a:shade val="80000"/>
+      </a:schemeClr>
+    </dgm:linClrLst>
+    <dgm:effectClrLst/>
+    <dgm:txLinClrLst/>
+    <dgm:txFillClrLst meth="repeat">
+      <a:schemeClr val="tx1"/>
+    </dgm:txFillClrLst>
+    <dgm:txEffectClrLst/>
+  </dgm:styleLbl>
+  <dgm:styleLbl name="fgAcc1">
+    <dgm:fillClrLst meth="repeat">
+      <a:schemeClr val="lt1">
+        <a:alpha val="90000"/>
+      </a:schemeClr>
+    </dgm:fillClrLst>
+    <dgm:linClrLst meth="repeat">
+      <a:schemeClr val="accent1"/>
+    </dgm:linClrLst>
+    <dgm:effectClrLst/>
+    <dgm:txLinClrLst/>
+    <dgm:txFillClrLst meth="repeat">
+      <a:schemeClr val="dk1"/>
+    </dgm:txFillClrLst>
+    <dgm:txEffectClrLst/>
+  </dgm:styleLbl>
+  <dgm:styleLbl name="conFgAcc1">
+    <dgm:fillClrLst meth="repeat">
+      <a:schemeClr val="lt1">
+        <a:alpha val="90000"/>
+      </a:schemeClr>
+    </dgm:fillClrLst>
+    <dgm:linClrLst meth="repeat">
+      <a:schemeClr val="accent1"/>
+    </dgm:linClrLst>
+    <dgm:effectClrLst/>
+    <dgm:txLinClrLst/>
+    <dgm:txFillClrLst meth="repeat">
+      <a:schemeClr val="dk1"/>
+    </dgm:txFillClrLst>
+    <dgm:txEffectClrLst/>
+  </dgm:styleLbl>
+  <dgm:styleLbl name="alignAcc1">
+    <dgm:fillClrLst meth="repeat">
+      <a:schemeClr val="lt1">
+        <a:alpha val="90000"/>
+      </a:schemeClr>
+    </dgm:fillClrLst>
+    <dgm:linClrLst meth="repeat">
+      <a:schemeClr val="accent1"/>
+    </dgm:linClrLst>
+    <dgm:effectClrLst/>
+    <dgm:txLinClrLst/>
+    <dgm:txFillClrLst meth="repeat">
+      <a:schemeClr val="dk1"/>
+    </dgm:txFillClrLst>
+    <dgm:txEffectClrLst/>
+  </dgm:styleLbl>
+  <dgm:styleLbl name="trAlignAcc1">
+    <dgm:fillClrLst meth="repeat">
+      <a:schemeClr val="lt1">
+        <a:alpha val="40000"/>
+      </a:schemeClr>
+    </dgm:fillClrLst>
+    <dgm:linClrLst meth="repeat">
+      <a:schemeClr val="accent1"/>
+    </dgm:linClrLst>
+    <dgm:effectClrLst/>
+    <dgm:txLinClrLst/>
+    <dgm:txFillClrLst meth="repeat">
+      <a:schemeClr val="dk1"/>
+    </dgm:txFillClrLst>
+    <dgm:txEffectClrLst/>
+  </dgm:styleLbl>
+  <dgm:styleLbl name="bgAcc1">
+    <dgm:fillClrLst meth="repeat">
+      <a:schemeClr val="lt1">
+        <a:alpha val="90000"/>
+      </a:schemeClr>
+    </dgm:fillClrLst>
+    <dgm:linClrLst meth="repeat">
+      <a:schemeClr val="accent1"/>
+    </dgm:linClrLst>
+    <dgm:effectClrLst/>
+    <dgm:txLinClrLst/>
+    <dgm:txFillClrLst meth="repeat">
+      <a:schemeClr val="dk1"/>
+    </dgm:txFillClrLst>
+    <dgm:txEffectClrLst/>
+  </dgm:styleLbl>
+  <dgm:styleLbl name="solidFgAcc1">
+    <dgm:fillClrLst meth="repeat">
+      <a:schemeClr val="lt1"/>
+    </dgm:fillClrLst>
+    <dgm:linClrLst meth="repeat">
+      <a:schemeClr val="accent1"/>
+    </dgm:linClrLst>
+    <dgm:effectClrLst/>
+    <dgm:txLinClrLst/>
+    <dgm:txFillClrLst meth="repeat">
+      <a:schemeClr val="dk1"/>
+    </dgm:txFillClrLst>
+    <dgm:txEffectClrLst/>
+  </dgm:styleLbl>
+  <dgm:styleLbl name="solidAlignAcc1">
+    <dgm:fillClrLst meth="repeat">
+      <a:schemeClr val="lt1"/>
+    </dgm:fillClrLst>
+    <dgm:linClrLst meth="repeat">
+      <a:schemeClr val="accent1"/>
+    </dgm:linClrLst>
+    <dgm:effectClrLst/>
+    <dgm:txLinClrLst/>
+    <dgm:txFillClrLst meth="repeat">
+      <a:schemeClr val="dk1"/>
+    </dgm:txFillClrLst>
+    <dgm:txEffectClrLst/>
+  </dgm:styleLbl>
+  <dgm:styleLbl name="solidBgAcc1">
+    <dgm:fillClrLst meth="repeat">
+      <a:schemeClr val="lt1"/>
+    </dgm:fillClrLst>
+    <dgm:linClrLst meth="repeat">
+      <a:schemeClr val="accent1"/>
+    </dgm:linClrLst>
+    <dgm:effectClrLst/>
+    <dgm:txLinClrLst/>
+    <dgm:txFillClrLst meth="repeat">
+      <a:schemeClr val="dk1"/>
+    </dgm:txFillClrLst>
+    <dgm:txEffectClrLst/>
+  </dgm:styleLbl>
+  <dgm:styleLbl name="fgAccFollowNode1">
+    <dgm:fillClrLst meth="repeat">
+      <a:schemeClr val="accent1">
+        <a:alpha val="90000"/>
+        <a:tint val="40000"/>
+      </a:schemeClr>
+    </dgm:fillClrLst>
+    <dgm:linClrLst meth="repeat">
+      <a:schemeClr val="accent1">
+        <a:alpha val="90000"/>
+        <a:tint val="40000"/>
+      </a:schemeClr>
+    </dgm:linClrLst>
+    <dgm:effectClrLst/>
+    <dgm:txLinClrLst/>
+    <dgm:txFillClrLst meth="repeat">
+      <a:schemeClr val="dk1"/>
+    </dgm:txFillClrLst>
+    <dgm:txEffectClrLst/>
+  </dgm:styleLbl>
+  <dgm:styleLbl name="alignAccFollowNode1">
+    <dgm:fillClrLst meth="repeat">
+      <a:schemeClr val="accent1">
+        <a:alpha val="90000"/>
+        <a:tint val="40000"/>
+      </a:schemeClr>
+    </dgm:fillClrLst>
+    <dgm:linClrLst meth="repeat">
+      <a:schemeClr val="accent1">
+        <a:alpha val="90000"/>
+        <a:tint val="40000"/>
+      </a:schemeClr>
+    </dgm:linClrLst>
+    <dgm:effectClrLst/>
+    <dgm:txLinClrLst/>
+    <dgm:txFillClrLst meth="repeat">
+      <a:schemeClr val="dk1"/>
+    </dgm:txFillClrLst>
+    <dgm:txEffectClrLst/>
+  </dgm:styleLbl>
+  <dgm:styleLbl name="bgAccFollowNode1">
+    <dgm:fillClrLst meth="repeat">
+      <a:schemeClr val="accent1">
+        <a:alpha val="90000"/>
+        <a:tint val="40000"/>
+      </a:schemeClr>
+    </dgm:fillClrLst>
+    <dgm:linClrLst meth="repeat">
+      <a:schemeClr val="accent1">
+        <a:alpha val="90000"/>
+        <a:tint val="40000"/>
+      </a:schemeClr>
+    </dgm:linClrLst>
+    <dgm:effectClrLst/>
+    <dgm:txLinClrLst/>
+    <dgm:txFillClrLst meth="repeat">
+      <a:schemeClr val="dk1"/>
+    </dgm:txFillClrLst>
+    <dgm:txEffectClrLst/>
+  </dgm:styleLbl>
+  <dgm:styleLbl name="fgAcc0">
+    <dgm:fillClrLst meth="repeat">
+      <a:schemeClr val="lt1">
+        <a:alpha val="90000"/>
+      </a:schemeClr>
+    </dgm:fillClrLst>
+    <dgm:linClrLst meth="repeat">
+      <a:schemeClr val="accent1"/>
+    </dgm:linClrLst>
+    <dgm:effectClrLst/>
+    <dgm:txLinClrLst/>
+    <dgm:txFillClrLst meth="repeat">
+      <a:schemeClr val="dk1"/>
+    </dgm:txFillClrLst>
+    <dgm:txEffectClrLst/>
+  </dgm:styleLbl>
+  <dgm:styleLbl name="fgAcc2">
+    <dgm:fillClrLst meth="repeat">
+      <a:schemeClr val="lt1">
+        <a:alpha val="90000"/>
+      </a:schemeClr>
+    </dgm:fillClrLst>
+    <dgm:linClrLst meth="repeat">
+      <a:schemeClr val="accent1"/>
+    </dgm:linClrLst>
+    <dgm:effectClrLst/>
+    <dgm:txLinClrLst/>
+    <dgm:txFillClrLst meth="repeat">
+      <a:schemeClr val="dk1"/>
+    </dgm:txFillClrLst>
+    <dgm:txEffectClrLst/>
+  </dgm:styleLbl>
+  <dgm:styleLbl name="fgAcc3">
+    <dgm:fillClrLst meth="repeat">
+      <a:schemeClr val="lt1">
+        <a:alpha val="90000"/>
+      </a:schemeClr>
+    </dgm:fillClrLst>
+    <dgm:linClrLst meth="repeat">
+      <a:schemeClr val="accent1"/>
+    </dgm:linClrLst>
+    <dgm:effectClrLst/>
+    <dgm:txLinClrLst/>
+    <dgm:txFillClrLst meth="repeat">
+      <a:schemeClr val="dk1"/>
+    </dgm:txFillClrLst>
+    <dgm:txEffectClrLst/>
+  </dgm:styleLbl>
+  <dgm:styleLbl name="fgAcc4">
+    <dgm:fillClrLst meth="repeat">
+      <a:schemeClr val="lt1">
+        <a:alpha val="90000"/>
+      </a:schemeClr>
+    </dgm:fillClrLst>
+    <dgm:linClrLst meth="repeat">
+      <a:schemeClr val="accent1"/>
+    </dgm:linClrLst>
+    <dgm:effectClrLst/>
+    <dgm:txLinClrLst/>
+    <dgm:txFillClrLst meth="repeat">
+      <a:schemeClr val="dk1"/>
+    </dgm:txFillClrLst>
+    <dgm:txEffectClrLst/>
+  </dgm:styleLbl>
+  <dgm:styleLbl name="bgShp">
+    <dgm:fillClrLst meth="repeat">
+      <a:schemeClr val="accent1">
+        <a:tint val="40000"/>
+      </a:schemeClr>
+    </dgm:fillClrLst>
+    <dgm:linClrLst meth="repeat">
+      <a:schemeClr val="accent1"/>
+    </dgm:linClrLst>
+    <dgm:effectClrLst/>
+    <dgm:txLinClrLst/>
+    <dgm:txFillClrLst meth="repeat">
+      <a:schemeClr val="dk1"/>
+    </dgm:txFillClrLst>
+    <dgm:txEffectClrLst/>
+  </dgm:styleLbl>
+  <dgm:styleLbl name="dkBgShp">
+    <dgm:fillClrLst meth="repeat">
+      <a:schemeClr val="accent1">
+        <a:shade val="80000"/>
+      </a:schemeClr>
+    </dgm:fillClrLst>
+    <dgm:linClrLst meth="repeat">
+      <a:schemeClr val="accent1"/>
+    </dgm:linClrLst>
+    <dgm:effectClrLst/>
+    <dgm:txLinClrLst/>
+    <dgm:txFillClrLst meth="repeat">
+      <a:schemeClr val="lt1"/>
+    </dgm:txFillClrLst>
+    <dgm:txEffectClrLst/>
+  </dgm:styleLbl>
+  <dgm:styleLbl name="trBgShp">
+    <dgm:fillClrLst meth="repeat">
+      <a:schemeClr val="accent1">
+        <a:tint val="50000"/>
+        <a:alpha val="40000"/>
+      </a:schemeClr>
+    </dgm:fillClrLst>
+    <dgm:linClrLst meth="repeat">
+      <a:schemeClr val="accent1"/>
+    </dgm:linClrLst>
+    <dgm:effectClrLst/>
+    <dgm:txLinClrLst/>
+    <dgm:txFillClrLst meth="repeat">
+      <a:schemeClr val="lt1"/>
+    </dgm:txFillClrLst>
+    <dgm:txEffectClrLst/>
+  </dgm:styleLbl>
+  <dgm:styleLbl name="fgShp">
+    <dgm:fillClrLst meth="repeat">
+      <a:schemeClr val="accent1">
+        <a:tint val="60000"/>
+      </a:schemeClr>
+    </dgm:fillClrLst>
+    <dgm:linClrLst meth="repeat">
+      <a:schemeClr val="lt1"/>
+    </dgm:linClrLst>
+    <dgm:effectClrLst/>
+    <dgm:txLinClrLst/>
+    <dgm:txFillClrLst meth="repeat">
+      <a:schemeClr val="dk1"/>
+    </dgm:txFillClrLst>
+    <dgm:txEffectClrLst/>
+  </dgm:styleLbl>
+  <dgm:styleLbl name="revTx">
+    <dgm:fillClrLst meth="repeat">
+      <a:schemeClr val="lt1">
+        <a:alpha val="0"/>
+      </a:schemeClr>
+    </dgm:fillClrLst>
+    <dgm:linClrLst meth="repeat">
+      <a:schemeClr val="dk1">
+        <a:alpha val="0"/>
+      </a:schemeClr>
+    </dgm:linClrLst>
+    <dgm:effectClrLst/>
+    <dgm:txLinClrLst/>
+    <dgm:txFillClrLst meth="repeat">
+      <a:schemeClr val="tx1"/>
+    </dgm:txFillClrLst>
+    <dgm:txEffectClrLst/>
+  </dgm:styleLbl>
+</dgm:colorsDef>
+</file>
+
+<file path=ppt/diagrams/colors6.xml><?xml version="1.0" encoding="utf-8"?>
 <dgm:colorsDef xmlns:dgm="http://schemas.openxmlformats.org/drawingml/2006/diagram" xmlns:a="http://schemas.openxmlformats.org/drawingml/2006/main" uniqueId="urn:microsoft.com/office/officeart/2005/8/colors/accent1_2">
   <dgm:title val=""/>
   <dgm:desc val=""/>
@@ -5724,6 +6478,446 @@
       <dgm:prSet/>
       <dgm:spPr>
         <a:solidFill>
+          <a:srgbClr val="00B0F0"/>
+        </a:solidFill>
+      </dgm:spPr>
+      <dgm:t>
+        <a:bodyPr/>
+        <a:lstStyle/>
+        <a:p>
+          <a:endParaRPr lang="en-GB"/>
+        </a:p>
+      </dgm:t>
+    </dgm:pt>
+    <dgm:pt modelId="{6144B140-3D8A-46A0-8857-9B23CA214C2C}">
+      <dgm:prSet phldrT="[Text]"/>
+      <dgm:spPr>
+        <a:solidFill>
+          <a:srgbClr val="00B0F0"/>
+        </a:solidFill>
+      </dgm:spPr>
+      <dgm:t>
+        <a:bodyPr/>
+        <a:lstStyle/>
+        <a:p>
+          <a:r>
+            <a:rPr lang="en-GB" dirty="0"/>
+            <a:t>Model Evaluation</a:t>
+          </a:r>
+        </a:p>
+      </dgm:t>
+    </dgm:pt>
+    <dgm:pt modelId="{D11FAFEF-3E33-41BD-B68B-F0D422664B6C}" type="parTrans" cxnId="{73415B0E-CAE7-4434-9156-216DCB4A3723}">
+      <dgm:prSet/>
+      <dgm:spPr/>
+      <dgm:t>
+        <a:bodyPr/>
+        <a:lstStyle/>
+        <a:p>
+          <a:endParaRPr lang="en-GB"/>
+        </a:p>
+      </dgm:t>
+    </dgm:pt>
+    <dgm:pt modelId="{A3EFC237-1EA5-4B14-BDB4-9CF8E4A33EC7}" type="sibTrans" cxnId="{73415B0E-CAE7-4434-9156-216DCB4A3723}">
+      <dgm:prSet/>
+      <dgm:spPr>
+        <a:solidFill>
+          <a:schemeClr val="bg1">
+            <a:lumMod val="85000"/>
+          </a:schemeClr>
+        </a:solidFill>
+      </dgm:spPr>
+      <dgm:t>
+        <a:bodyPr/>
+        <a:lstStyle/>
+        <a:p>
+          <a:endParaRPr lang="en-GB"/>
+        </a:p>
+      </dgm:t>
+    </dgm:pt>
+    <dgm:pt modelId="{6795EBB9-09B3-4509-85E4-AC18D2BF2E61}">
+      <dgm:prSet phldrT="[Text]"/>
+      <dgm:spPr>
+        <a:solidFill>
+          <a:schemeClr val="bg1">
+            <a:lumMod val="85000"/>
+          </a:schemeClr>
+        </a:solidFill>
+      </dgm:spPr>
+      <dgm:t>
+        <a:bodyPr/>
+        <a:lstStyle/>
+        <a:p>
+          <a:r>
+            <a:rPr lang="en-GB" dirty="0"/>
+            <a:t>Insights and Deployment</a:t>
+          </a:r>
+        </a:p>
+      </dgm:t>
+    </dgm:pt>
+    <dgm:pt modelId="{3387A672-9596-4BF4-8456-61008EA2BA4F}" type="parTrans" cxnId="{9B5764FC-0DE0-43A2-85E5-B888C26EAC9F}">
+      <dgm:prSet/>
+      <dgm:spPr/>
+      <dgm:t>
+        <a:bodyPr/>
+        <a:lstStyle/>
+        <a:p>
+          <a:endParaRPr lang="en-GB"/>
+        </a:p>
+      </dgm:t>
+    </dgm:pt>
+    <dgm:pt modelId="{717FC620-AC9A-41AB-AED5-347274AC0752}" type="sibTrans" cxnId="{9B5764FC-0DE0-43A2-85E5-B888C26EAC9F}">
+      <dgm:prSet/>
+      <dgm:spPr/>
+      <dgm:t>
+        <a:bodyPr/>
+        <a:lstStyle/>
+        <a:p>
+          <a:endParaRPr lang="en-GB"/>
+        </a:p>
+      </dgm:t>
+    </dgm:pt>
+    <dgm:pt modelId="{C84FB0DD-B4FA-4A2C-A8DC-240EC9957DAF}" type="pres">
+      <dgm:prSet presAssocID="{ACF51370-85B3-45F5-B1F2-1EAF62F281B8}" presName="linearFlow" presStyleCnt="0">
+        <dgm:presLayoutVars>
+          <dgm:resizeHandles val="exact"/>
+        </dgm:presLayoutVars>
+      </dgm:prSet>
+      <dgm:spPr/>
+    </dgm:pt>
+    <dgm:pt modelId="{92A658E6-7CC5-4189-BC1B-77D1C61344F0}" type="pres">
+      <dgm:prSet presAssocID="{B0E748FF-430B-4E14-8700-17868D69D00D}" presName="node" presStyleLbl="node1" presStyleIdx="0" presStyleCnt="6">
+        <dgm:presLayoutVars>
+          <dgm:bulletEnabled val="1"/>
+        </dgm:presLayoutVars>
+      </dgm:prSet>
+      <dgm:spPr/>
+    </dgm:pt>
+    <dgm:pt modelId="{F24AEA42-5A51-4031-B54A-3964F49F5481}" type="pres">
+      <dgm:prSet presAssocID="{FF7B1DE4-39F4-40E1-93A1-9DFFF8C43EB7}" presName="sibTrans" presStyleLbl="sibTrans2D1" presStyleIdx="0" presStyleCnt="5"/>
+      <dgm:spPr/>
+    </dgm:pt>
+    <dgm:pt modelId="{E4CAB24B-3F60-4511-A8B9-24CDE48F7927}" type="pres">
+      <dgm:prSet presAssocID="{FF7B1DE4-39F4-40E1-93A1-9DFFF8C43EB7}" presName="connectorText" presStyleLbl="sibTrans2D1" presStyleIdx="0" presStyleCnt="5"/>
+      <dgm:spPr/>
+    </dgm:pt>
+    <dgm:pt modelId="{64CEAE35-FDEE-44EB-B8E3-C6ADAF48582D}" type="pres">
+      <dgm:prSet presAssocID="{8F81F49B-417C-48A8-A874-67BF11513BEF}" presName="node" presStyleLbl="node1" presStyleIdx="1" presStyleCnt="6">
+        <dgm:presLayoutVars>
+          <dgm:bulletEnabled val="1"/>
+        </dgm:presLayoutVars>
+      </dgm:prSet>
+      <dgm:spPr/>
+    </dgm:pt>
+    <dgm:pt modelId="{802FAF77-7556-49F2-955C-77B2602B3E2C}" type="pres">
+      <dgm:prSet presAssocID="{332A293A-B197-4B07-98AE-588B45990AED}" presName="sibTrans" presStyleLbl="sibTrans2D1" presStyleIdx="1" presStyleCnt="5"/>
+      <dgm:spPr/>
+    </dgm:pt>
+    <dgm:pt modelId="{676E7616-2250-46C3-9BDF-ABBE8B7299D8}" type="pres">
+      <dgm:prSet presAssocID="{332A293A-B197-4B07-98AE-588B45990AED}" presName="connectorText" presStyleLbl="sibTrans2D1" presStyleIdx="1" presStyleCnt="5"/>
+      <dgm:spPr/>
+    </dgm:pt>
+    <dgm:pt modelId="{DC57E3AD-10C7-4582-B304-DE305EB9090E}" type="pres">
+      <dgm:prSet presAssocID="{CE5B8E70-2FB1-4790-9F64-7593EC6BAFE8}" presName="node" presStyleLbl="node1" presStyleIdx="2" presStyleCnt="6">
+        <dgm:presLayoutVars>
+          <dgm:bulletEnabled val="1"/>
+        </dgm:presLayoutVars>
+      </dgm:prSet>
+      <dgm:spPr/>
+    </dgm:pt>
+    <dgm:pt modelId="{FF3CF396-3DCD-47E6-9D68-C4B80479562B}" type="pres">
+      <dgm:prSet presAssocID="{70863C52-0403-4334-8A8D-45312E5B0E32}" presName="sibTrans" presStyleLbl="sibTrans2D1" presStyleIdx="2" presStyleCnt="5"/>
+      <dgm:spPr/>
+    </dgm:pt>
+    <dgm:pt modelId="{9E1E813D-2BF2-43EE-84E5-1C376A77DEB6}" type="pres">
+      <dgm:prSet presAssocID="{70863C52-0403-4334-8A8D-45312E5B0E32}" presName="connectorText" presStyleLbl="sibTrans2D1" presStyleIdx="2" presStyleCnt="5"/>
+      <dgm:spPr/>
+    </dgm:pt>
+    <dgm:pt modelId="{36B43830-23D9-4111-86D9-A089E16BC5B7}" type="pres">
+      <dgm:prSet presAssocID="{6CBC1F07-AE4F-478E-94DD-C54ECCC82E7E}" presName="node" presStyleLbl="node1" presStyleIdx="3" presStyleCnt="6">
+        <dgm:presLayoutVars>
+          <dgm:bulletEnabled val="1"/>
+        </dgm:presLayoutVars>
+      </dgm:prSet>
+      <dgm:spPr/>
+    </dgm:pt>
+    <dgm:pt modelId="{9C29D5F3-FB41-442B-A3DC-90C523476856}" type="pres">
+      <dgm:prSet presAssocID="{A9248EF2-DBC8-46D6-83B3-84200D3575CE}" presName="sibTrans" presStyleLbl="sibTrans2D1" presStyleIdx="3" presStyleCnt="5"/>
+      <dgm:spPr/>
+    </dgm:pt>
+    <dgm:pt modelId="{707B136A-6F6A-4AF1-B583-B63375EB146E}" type="pres">
+      <dgm:prSet presAssocID="{A9248EF2-DBC8-46D6-83B3-84200D3575CE}" presName="connectorText" presStyleLbl="sibTrans2D1" presStyleIdx="3" presStyleCnt="5"/>
+      <dgm:spPr/>
+    </dgm:pt>
+    <dgm:pt modelId="{C7A2B9FE-0100-493F-86A4-F4055FFCB6DA}" type="pres">
+      <dgm:prSet presAssocID="{6144B140-3D8A-46A0-8857-9B23CA214C2C}" presName="node" presStyleLbl="node1" presStyleIdx="4" presStyleCnt="6">
+        <dgm:presLayoutVars>
+          <dgm:bulletEnabled val="1"/>
+        </dgm:presLayoutVars>
+      </dgm:prSet>
+      <dgm:spPr/>
+    </dgm:pt>
+    <dgm:pt modelId="{B3358F8A-AF90-4A62-918C-F25C09200E18}" type="pres">
+      <dgm:prSet presAssocID="{A3EFC237-1EA5-4B14-BDB4-9CF8E4A33EC7}" presName="sibTrans" presStyleLbl="sibTrans2D1" presStyleIdx="4" presStyleCnt="5"/>
+      <dgm:spPr/>
+    </dgm:pt>
+    <dgm:pt modelId="{735329D0-7979-4E05-A991-267DFD441437}" type="pres">
+      <dgm:prSet presAssocID="{A3EFC237-1EA5-4B14-BDB4-9CF8E4A33EC7}" presName="connectorText" presStyleLbl="sibTrans2D1" presStyleIdx="4" presStyleCnt="5"/>
+      <dgm:spPr/>
+    </dgm:pt>
+    <dgm:pt modelId="{8EBF03C7-9E1A-4381-A941-82A040BE413B}" type="pres">
+      <dgm:prSet presAssocID="{6795EBB9-09B3-4509-85E4-AC18D2BF2E61}" presName="node" presStyleLbl="node1" presStyleIdx="5" presStyleCnt="6">
+        <dgm:presLayoutVars>
+          <dgm:bulletEnabled val="1"/>
+        </dgm:presLayoutVars>
+      </dgm:prSet>
+      <dgm:spPr/>
+    </dgm:pt>
+  </dgm:ptLst>
+  <dgm:cxnLst>
+    <dgm:cxn modelId="{73415B0E-CAE7-4434-9156-216DCB4A3723}" srcId="{ACF51370-85B3-45F5-B1F2-1EAF62F281B8}" destId="{6144B140-3D8A-46A0-8857-9B23CA214C2C}" srcOrd="4" destOrd="0" parTransId="{D11FAFEF-3E33-41BD-B68B-F0D422664B6C}" sibTransId="{A3EFC237-1EA5-4B14-BDB4-9CF8E4A33EC7}"/>
+    <dgm:cxn modelId="{1FFC5C31-DF63-4A21-A7DF-F4FF14CABEB6}" type="presOf" srcId="{A3EFC237-1EA5-4B14-BDB4-9CF8E4A33EC7}" destId="{B3358F8A-AF90-4A62-918C-F25C09200E18}" srcOrd="0" destOrd="0" presId="urn:microsoft.com/office/officeart/2005/8/layout/process2"/>
+    <dgm:cxn modelId="{E4A24042-059F-4A91-914F-646B264B3338}" type="presOf" srcId="{332A293A-B197-4B07-98AE-588B45990AED}" destId="{802FAF77-7556-49F2-955C-77B2602B3E2C}" srcOrd="0" destOrd="0" presId="urn:microsoft.com/office/officeart/2005/8/layout/process2"/>
+    <dgm:cxn modelId="{0B4D4A49-B68D-47A0-9727-225D39AAB671}" type="presOf" srcId="{FF7B1DE4-39F4-40E1-93A1-9DFFF8C43EB7}" destId="{E4CAB24B-3F60-4511-A8B9-24CDE48F7927}" srcOrd="1" destOrd="0" presId="urn:microsoft.com/office/officeart/2005/8/layout/process2"/>
+    <dgm:cxn modelId="{3B3A8471-336F-41F5-8B77-4735AC596D1D}" type="presOf" srcId="{B0E748FF-430B-4E14-8700-17868D69D00D}" destId="{92A658E6-7CC5-4189-BC1B-77D1C61344F0}" srcOrd="0" destOrd="0" presId="urn:microsoft.com/office/officeart/2005/8/layout/process2"/>
+    <dgm:cxn modelId="{AEDEE153-E036-4669-AF79-F74A1787E073}" type="presOf" srcId="{A9248EF2-DBC8-46D6-83B3-84200D3575CE}" destId="{9C29D5F3-FB41-442B-A3DC-90C523476856}" srcOrd="0" destOrd="0" presId="urn:microsoft.com/office/officeart/2005/8/layout/process2"/>
+    <dgm:cxn modelId="{7B31F579-3E0E-4DDE-A8F3-AA0A45DC7ED6}" type="presOf" srcId="{ACF51370-85B3-45F5-B1F2-1EAF62F281B8}" destId="{C84FB0DD-B4FA-4A2C-A8DC-240EC9957DAF}" srcOrd="0" destOrd="0" presId="urn:microsoft.com/office/officeart/2005/8/layout/process2"/>
+    <dgm:cxn modelId="{97D6E387-F906-47A4-839E-2E55020053C2}" type="presOf" srcId="{332A293A-B197-4B07-98AE-588B45990AED}" destId="{676E7616-2250-46C3-9BDF-ABBE8B7299D8}" srcOrd="1" destOrd="0" presId="urn:microsoft.com/office/officeart/2005/8/layout/process2"/>
+    <dgm:cxn modelId="{2749F68F-C856-4834-949E-905205C2169B}" srcId="{ACF51370-85B3-45F5-B1F2-1EAF62F281B8}" destId="{6CBC1F07-AE4F-478E-94DD-C54ECCC82E7E}" srcOrd="3" destOrd="0" parTransId="{6BD6E632-2914-4177-AA82-55B18D638C18}" sibTransId="{A9248EF2-DBC8-46D6-83B3-84200D3575CE}"/>
+    <dgm:cxn modelId="{9F009A9B-B42F-481C-B46E-C80BE43CE089}" type="presOf" srcId="{6795EBB9-09B3-4509-85E4-AC18D2BF2E61}" destId="{8EBF03C7-9E1A-4381-A941-82A040BE413B}" srcOrd="0" destOrd="0" presId="urn:microsoft.com/office/officeart/2005/8/layout/process2"/>
+    <dgm:cxn modelId="{9B95FAA3-8D17-4C3B-8E8B-9349CF83C162}" type="presOf" srcId="{6CBC1F07-AE4F-478E-94DD-C54ECCC82E7E}" destId="{36B43830-23D9-4111-86D9-A089E16BC5B7}" srcOrd="0" destOrd="0" presId="urn:microsoft.com/office/officeart/2005/8/layout/process2"/>
+    <dgm:cxn modelId="{430D86A7-5E8F-4B7A-8E56-1B478F32EC00}" type="presOf" srcId="{8F81F49B-417C-48A8-A874-67BF11513BEF}" destId="{64CEAE35-FDEE-44EB-B8E3-C6ADAF48582D}" srcOrd="0" destOrd="0" presId="urn:microsoft.com/office/officeart/2005/8/layout/process2"/>
+    <dgm:cxn modelId="{F0FEABB6-2984-4F09-B156-50EBD93CDB23}" srcId="{ACF51370-85B3-45F5-B1F2-1EAF62F281B8}" destId="{CE5B8E70-2FB1-4790-9F64-7593EC6BAFE8}" srcOrd="2" destOrd="0" parTransId="{20796A39-1EF6-42D5-AFB2-074C6EFFE2F8}" sibTransId="{70863C52-0403-4334-8A8D-45312E5B0E32}"/>
+    <dgm:cxn modelId="{F8BC74B7-768B-46B3-A5CE-55E5068A926C}" type="presOf" srcId="{70863C52-0403-4334-8A8D-45312E5B0E32}" destId="{FF3CF396-3DCD-47E6-9D68-C4B80479562B}" srcOrd="0" destOrd="0" presId="urn:microsoft.com/office/officeart/2005/8/layout/process2"/>
+    <dgm:cxn modelId="{5A0990BA-36BC-40F2-9A75-F22C821078C6}" srcId="{ACF51370-85B3-45F5-B1F2-1EAF62F281B8}" destId="{8F81F49B-417C-48A8-A874-67BF11513BEF}" srcOrd="1" destOrd="0" parTransId="{647F1F45-3343-4FBE-8C03-CA20D08AB401}" sibTransId="{332A293A-B197-4B07-98AE-588B45990AED}"/>
+    <dgm:cxn modelId="{73C0BBBC-B4E8-4948-9E82-22858BC2F9AC}" type="presOf" srcId="{70863C52-0403-4334-8A8D-45312E5B0E32}" destId="{9E1E813D-2BF2-43EE-84E5-1C376A77DEB6}" srcOrd="1" destOrd="0" presId="urn:microsoft.com/office/officeart/2005/8/layout/process2"/>
+    <dgm:cxn modelId="{2EF4FDC8-997C-45F9-B911-34E19AF4CE6F}" srcId="{ACF51370-85B3-45F5-B1F2-1EAF62F281B8}" destId="{B0E748FF-430B-4E14-8700-17868D69D00D}" srcOrd="0" destOrd="0" parTransId="{EC5BEC44-FE24-4F99-8421-438259041524}" sibTransId="{FF7B1DE4-39F4-40E1-93A1-9DFFF8C43EB7}"/>
+    <dgm:cxn modelId="{01EC52C9-C421-476A-BB0E-950C1BDD231F}" type="presOf" srcId="{A3EFC237-1EA5-4B14-BDB4-9CF8E4A33EC7}" destId="{735329D0-7979-4E05-A991-267DFD441437}" srcOrd="1" destOrd="0" presId="urn:microsoft.com/office/officeart/2005/8/layout/process2"/>
+    <dgm:cxn modelId="{600466CB-76CD-4DEF-B68B-9A0E3CA51675}" type="presOf" srcId="{6144B140-3D8A-46A0-8857-9B23CA214C2C}" destId="{C7A2B9FE-0100-493F-86A4-F4055FFCB6DA}" srcOrd="0" destOrd="0" presId="urn:microsoft.com/office/officeart/2005/8/layout/process2"/>
+    <dgm:cxn modelId="{40CD74D0-FC6C-4082-AAA8-C9CCAB1F831B}" type="presOf" srcId="{FF7B1DE4-39F4-40E1-93A1-9DFFF8C43EB7}" destId="{F24AEA42-5A51-4031-B54A-3964F49F5481}" srcOrd="0" destOrd="0" presId="urn:microsoft.com/office/officeart/2005/8/layout/process2"/>
+    <dgm:cxn modelId="{D09626DA-D3B9-4CF9-A36C-5825E0A606AD}" type="presOf" srcId="{CE5B8E70-2FB1-4790-9F64-7593EC6BAFE8}" destId="{DC57E3AD-10C7-4582-B304-DE305EB9090E}" srcOrd="0" destOrd="0" presId="urn:microsoft.com/office/officeart/2005/8/layout/process2"/>
+    <dgm:cxn modelId="{30C0B3DD-8461-4DF2-A255-82C04538690D}" type="presOf" srcId="{A9248EF2-DBC8-46D6-83B3-84200D3575CE}" destId="{707B136A-6F6A-4AF1-B583-B63375EB146E}" srcOrd="1" destOrd="0" presId="urn:microsoft.com/office/officeart/2005/8/layout/process2"/>
+    <dgm:cxn modelId="{9B5764FC-0DE0-43A2-85E5-B888C26EAC9F}" srcId="{ACF51370-85B3-45F5-B1F2-1EAF62F281B8}" destId="{6795EBB9-09B3-4509-85E4-AC18D2BF2E61}" srcOrd="5" destOrd="0" parTransId="{3387A672-9596-4BF4-8456-61008EA2BA4F}" sibTransId="{717FC620-AC9A-41AB-AED5-347274AC0752}"/>
+    <dgm:cxn modelId="{E3EFC062-7B9F-46AE-853F-2FEBE16EE75F}" type="presParOf" srcId="{C84FB0DD-B4FA-4A2C-A8DC-240EC9957DAF}" destId="{92A658E6-7CC5-4189-BC1B-77D1C61344F0}" srcOrd="0" destOrd="0" presId="urn:microsoft.com/office/officeart/2005/8/layout/process2"/>
+    <dgm:cxn modelId="{BDD864E4-D605-466E-B90F-B5877800C60C}" type="presParOf" srcId="{C84FB0DD-B4FA-4A2C-A8DC-240EC9957DAF}" destId="{F24AEA42-5A51-4031-B54A-3964F49F5481}" srcOrd="1" destOrd="0" presId="urn:microsoft.com/office/officeart/2005/8/layout/process2"/>
+    <dgm:cxn modelId="{095F95C2-673A-475F-B43D-6E509D132855}" type="presParOf" srcId="{F24AEA42-5A51-4031-B54A-3964F49F5481}" destId="{E4CAB24B-3F60-4511-A8B9-24CDE48F7927}" srcOrd="0" destOrd="0" presId="urn:microsoft.com/office/officeart/2005/8/layout/process2"/>
+    <dgm:cxn modelId="{B14E3342-7C84-4F4F-B5B9-F493EF3C66DE}" type="presParOf" srcId="{C84FB0DD-B4FA-4A2C-A8DC-240EC9957DAF}" destId="{64CEAE35-FDEE-44EB-B8E3-C6ADAF48582D}" srcOrd="2" destOrd="0" presId="urn:microsoft.com/office/officeart/2005/8/layout/process2"/>
+    <dgm:cxn modelId="{5459FF47-F11F-4F87-BE52-3145F479C9F0}" type="presParOf" srcId="{C84FB0DD-B4FA-4A2C-A8DC-240EC9957DAF}" destId="{802FAF77-7556-49F2-955C-77B2602B3E2C}" srcOrd="3" destOrd="0" presId="urn:microsoft.com/office/officeart/2005/8/layout/process2"/>
+    <dgm:cxn modelId="{93069BBF-D4D9-447B-83ED-32CDAC097784}" type="presParOf" srcId="{802FAF77-7556-49F2-955C-77B2602B3E2C}" destId="{676E7616-2250-46C3-9BDF-ABBE8B7299D8}" srcOrd="0" destOrd="0" presId="urn:microsoft.com/office/officeart/2005/8/layout/process2"/>
+    <dgm:cxn modelId="{1874CACE-2989-4426-B147-2B522A0C17D5}" type="presParOf" srcId="{C84FB0DD-B4FA-4A2C-A8DC-240EC9957DAF}" destId="{DC57E3AD-10C7-4582-B304-DE305EB9090E}" srcOrd="4" destOrd="0" presId="urn:microsoft.com/office/officeart/2005/8/layout/process2"/>
+    <dgm:cxn modelId="{451C5788-A054-481D-B8C9-A7EFF376E262}" type="presParOf" srcId="{C84FB0DD-B4FA-4A2C-A8DC-240EC9957DAF}" destId="{FF3CF396-3DCD-47E6-9D68-C4B80479562B}" srcOrd="5" destOrd="0" presId="urn:microsoft.com/office/officeart/2005/8/layout/process2"/>
+    <dgm:cxn modelId="{D607C110-258B-41B1-8D93-5EF3839DAD73}" type="presParOf" srcId="{FF3CF396-3DCD-47E6-9D68-C4B80479562B}" destId="{9E1E813D-2BF2-43EE-84E5-1C376A77DEB6}" srcOrd="0" destOrd="0" presId="urn:microsoft.com/office/officeart/2005/8/layout/process2"/>
+    <dgm:cxn modelId="{DD69E8FF-D36F-4DF0-A10C-D7191933344C}" type="presParOf" srcId="{C84FB0DD-B4FA-4A2C-A8DC-240EC9957DAF}" destId="{36B43830-23D9-4111-86D9-A089E16BC5B7}" srcOrd="6" destOrd="0" presId="urn:microsoft.com/office/officeart/2005/8/layout/process2"/>
+    <dgm:cxn modelId="{E90B6125-2A0E-4DFC-B54C-ED117409A24D}" type="presParOf" srcId="{C84FB0DD-B4FA-4A2C-A8DC-240EC9957DAF}" destId="{9C29D5F3-FB41-442B-A3DC-90C523476856}" srcOrd="7" destOrd="0" presId="urn:microsoft.com/office/officeart/2005/8/layout/process2"/>
+    <dgm:cxn modelId="{B8195E93-9ADD-49F0-81F1-C1BB5A520583}" type="presParOf" srcId="{9C29D5F3-FB41-442B-A3DC-90C523476856}" destId="{707B136A-6F6A-4AF1-B583-B63375EB146E}" srcOrd="0" destOrd="0" presId="urn:microsoft.com/office/officeart/2005/8/layout/process2"/>
+    <dgm:cxn modelId="{7B69549F-5762-4922-A130-CB140C6C9803}" type="presParOf" srcId="{C84FB0DD-B4FA-4A2C-A8DC-240EC9957DAF}" destId="{C7A2B9FE-0100-493F-86A4-F4055FFCB6DA}" srcOrd="8" destOrd="0" presId="urn:microsoft.com/office/officeart/2005/8/layout/process2"/>
+    <dgm:cxn modelId="{2AEE37ED-DFC6-4D67-AAD3-43A5A30E0E75}" type="presParOf" srcId="{C84FB0DD-B4FA-4A2C-A8DC-240EC9957DAF}" destId="{B3358F8A-AF90-4A62-918C-F25C09200E18}" srcOrd="9" destOrd="0" presId="urn:microsoft.com/office/officeart/2005/8/layout/process2"/>
+    <dgm:cxn modelId="{BEE09B66-2774-4E73-9932-548BBEA82256}" type="presParOf" srcId="{B3358F8A-AF90-4A62-918C-F25C09200E18}" destId="{735329D0-7979-4E05-A991-267DFD441437}" srcOrd="0" destOrd="0" presId="urn:microsoft.com/office/officeart/2005/8/layout/process2"/>
+    <dgm:cxn modelId="{002748CD-B8F0-4305-90D1-3BA4065AF761}" type="presParOf" srcId="{C84FB0DD-B4FA-4A2C-A8DC-240EC9957DAF}" destId="{8EBF03C7-9E1A-4381-A941-82A040BE413B}" srcOrd="10" destOrd="0" presId="urn:microsoft.com/office/officeart/2005/8/layout/process2"/>
+  </dgm:cxnLst>
+  <dgm:bg/>
+  <dgm:whole/>
+  <dgm:extLst>
+    <a:ext uri="http://schemas.microsoft.com/office/drawing/2008/diagram">
+      <dsp:dataModelExt xmlns:dsp="http://schemas.microsoft.com/office/drawing/2008/diagram" relId="rId6" minVer="http://schemas.openxmlformats.org/drawingml/2006/diagram"/>
+    </a:ext>
+  </dgm:extLst>
+</dgm:dataModel>
+</file>
+
+<file path=ppt/diagrams/data6.xml><?xml version="1.0" encoding="utf-8"?>
+<dgm:dataModel xmlns:dgm="http://schemas.openxmlformats.org/drawingml/2006/diagram" xmlns:a="http://schemas.openxmlformats.org/drawingml/2006/main">
+  <dgm:ptLst>
+    <dgm:pt modelId="{ACF51370-85B3-45F5-B1F2-1EAF62F281B8}" type="doc">
+      <dgm:prSet loTypeId="urn:microsoft.com/office/officeart/2005/8/layout/process2" loCatId="process" qsTypeId="urn:microsoft.com/office/officeart/2005/8/quickstyle/simple1" qsCatId="simple" csTypeId="urn:microsoft.com/office/officeart/2005/8/colors/accent1_2" csCatId="accent1" phldr="1"/>
+      <dgm:spPr/>
+      <dgm:t>
+        <a:bodyPr/>
+        <a:lstStyle/>
+        <a:p>
+          <a:endParaRPr lang="en-GB"/>
+        </a:p>
+      </dgm:t>
+    </dgm:pt>
+    <dgm:pt modelId="{B0E748FF-430B-4E14-8700-17868D69D00D}">
+      <dgm:prSet phldrT="[Text]"/>
+      <dgm:spPr>
+        <a:solidFill>
+          <a:schemeClr val="bg1">
+            <a:lumMod val="85000"/>
+          </a:schemeClr>
+        </a:solidFill>
+      </dgm:spPr>
+      <dgm:t>
+        <a:bodyPr/>
+        <a:lstStyle/>
+        <a:p>
+          <a:r>
+            <a:rPr lang="en-GB" dirty="0"/>
+            <a:t>Problem Definition</a:t>
+          </a:r>
+        </a:p>
+      </dgm:t>
+    </dgm:pt>
+    <dgm:pt modelId="{EC5BEC44-FE24-4F99-8421-438259041524}" type="parTrans" cxnId="{2EF4FDC8-997C-45F9-B911-34E19AF4CE6F}">
+      <dgm:prSet/>
+      <dgm:spPr/>
+      <dgm:t>
+        <a:bodyPr/>
+        <a:lstStyle/>
+        <a:p>
+          <a:endParaRPr lang="en-GB"/>
+        </a:p>
+      </dgm:t>
+    </dgm:pt>
+    <dgm:pt modelId="{FF7B1DE4-39F4-40E1-93A1-9DFFF8C43EB7}" type="sibTrans" cxnId="{2EF4FDC8-997C-45F9-B911-34E19AF4CE6F}">
+      <dgm:prSet/>
+      <dgm:spPr>
+        <a:solidFill>
+          <a:schemeClr val="bg1">
+            <a:lumMod val="85000"/>
+          </a:schemeClr>
+        </a:solidFill>
+      </dgm:spPr>
+      <dgm:t>
+        <a:bodyPr/>
+        <a:lstStyle/>
+        <a:p>
+          <a:endParaRPr lang="en-GB"/>
+        </a:p>
+      </dgm:t>
+    </dgm:pt>
+    <dgm:pt modelId="{8F81F49B-417C-48A8-A874-67BF11513BEF}">
+      <dgm:prSet phldrT="[Text]"/>
+      <dgm:spPr>
+        <a:solidFill>
+          <a:schemeClr val="bg1">
+            <a:lumMod val="85000"/>
+          </a:schemeClr>
+        </a:solidFill>
+      </dgm:spPr>
+      <dgm:t>
+        <a:bodyPr/>
+        <a:lstStyle/>
+        <a:p>
+          <a:r>
+            <a:rPr lang="en-GB" dirty="0"/>
+            <a:t>Data Collection</a:t>
+          </a:r>
+        </a:p>
+      </dgm:t>
+    </dgm:pt>
+    <dgm:pt modelId="{647F1F45-3343-4FBE-8C03-CA20D08AB401}" type="parTrans" cxnId="{5A0990BA-36BC-40F2-9A75-F22C821078C6}">
+      <dgm:prSet/>
+      <dgm:spPr/>
+      <dgm:t>
+        <a:bodyPr/>
+        <a:lstStyle/>
+        <a:p>
+          <a:endParaRPr lang="en-GB"/>
+        </a:p>
+      </dgm:t>
+    </dgm:pt>
+    <dgm:pt modelId="{332A293A-B197-4B07-98AE-588B45990AED}" type="sibTrans" cxnId="{5A0990BA-36BC-40F2-9A75-F22C821078C6}">
+      <dgm:prSet/>
+      <dgm:spPr>
+        <a:solidFill>
+          <a:schemeClr val="bg1">
+            <a:lumMod val="85000"/>
+          </a:schemeClr>
+        </a:solidFill>
+      </dgm:spPr>
+      <dgm:t>
+        <a:bodyPr/>
+        <a:lstStyle/>
+        <a:p>
+          <a:endParaRPr lang="en-GB"/>
+        </a:p>
+      </dgm:t>
+    </dgm:pt>
+    <dgm:pt modelId="{CE5B8E70-2FB1-4790-9F64-7593EC6BAFE8}">
+      <dgm:prSet phldrT="[Text]"/>
+      <dgm:spPr>
+        <a:solidFill>
+          <a:schemeClr val="bg1">
+            <a:lumMod val="85000"/>
+          </a:schemeClr>
+        </a:solidFill>
+      </dgm:spPr>
+      <dgm:t>
+        <a:bodyPr/>
+        <a:lstStyle/>
+        <a:p>
+          <a:r>
+            <a:rPr lang="en-GB" dirty="0"/>
+            <a:t>Data Preparation</a:t>
+          </a:r>
+        </a:p>
+      </dgm:t>
+    </dgm:pt>
+    <dgm:pt modelId="{20796A39-1EF6-42D5-AFB2-074C6EFFE2F8}" type="parTrans" cxnId="{F0FEABB6-2984-4F09-B156-50EBD93CDB23}">
+      <dgm:prSet/>
+      <dgm:spPr/>
+      <dgm:t>
+        <a:bodyPr/>
+        <a:lstStyle/>
+        <a:p>
+          <a:endParaRPr lang="en-GB"/>
+        </a:p>
+      </dgm:t>
+    </dgm:pt>
+    <dgm:pt modelId="{70863C52-0403-4334-8A8D-45312E5B0E32}" type="sibTrans" cxnId="{F0FEABB6-2984-4F09-B156-50EBD93CDB23}">
+      <dgm:prSet/>
+      <dgm:spPr>
+        <a:solidFill>
+          <a:schemeClr val="bg1">
+            <a:lumMod val="85000"/>
+          </a:schemeClr>
+        </a:solidFill>
+      </dgm:spPr>
+      <dgm:t>
+        <a:bodyPr/>
+        <a:lstStyle/>
+        <a:p>
+          <a:endParaRPr lang="en-GB"/>
+        </a:p>
+      </dgm:t>
+    </dgm:pt>
+    <dgm:pt modelId="{6CBC1F07-AE4F-478E-94DD-C54ECCC82E7E}">
+      <dgm:prSet phldrT="[Text]"/>
+      <dgm:spPr>
+        <a:solidFill>
+          <a:schemeClr val="bg1">
+            <a:lumMod val="85000"/>
+          </a:schemeClr>
+        </a:solidFill>
+      </dgm:spPr>
+      <dgm:t>
+        <a:bodyPr/>
+        <a:lstStyle/>
+        <a:p>
+          <a:r>
+            <a:rPr lang="en-GB" dirty="0"/>
+            <a:t>Model Building</a:t>
+          </a:r>
+        </a:p>
+      </dgm:t>
+    </dgm:pt>
+    <dgm:pt modelId="{6BD6E632-2914-4177-AA82-55B18D638C18}" type="parTrans" cxnId="{2749F68F-C856-4834-949E-905205C2169B}">
+      <dgm:prSet/>
+      <dgm:spPr/>
+      <dgm:t>
+        <a:bodyPr/>
+        <a:lstStyle/>
+        <a:p>
+          <a:endParaRPr lang="en-GB"/>
+        </a:p>
+      </dgm:t>
+    </dgm:pt>
+    <dgm:pt modelId="{A9248EF2-DBC8-46D6-83B3-84200D3575CE}" type="sibTrans" cxnId="{2749F68F-C856-4834-949E-905205C2169B}">
+      <dgm:prSet/>
+      <dgm:spPr>
+        <a:solidFill>
           <a:schemeClr val="bg1">
             <a:lumMod val="85000"/>
           </a:schemeClr>
@@ -5789,9 +6983,7 @@
       <dgm:prSet phldrT="[Text]"/>
       <dgm:spPr>
         <a:solidFill>
-          <a:schemeClr val="bg1">
-            <a:lumMod val="85000"/>
-          </a:schemeClr>
+          <a:srgbClr val="00B0F0"/>
         </a:solidFill>
       </dgm:spPr>
       <dgm:t>
@@ -9430,6 +10622,806 @@
           </a:avLst>
         </a:prstGeom>
         <a:solidFill>
+          <a:srgbClr val="00B0F0"/>
+        </a:solidFill>
+        <a:ln>
+          <a:noFill/>
+        </a:ln>
+        <a:effectLst/>
+      </dsp:spPr>
+      <dsp:style>
+        <a:lnRef idx="0">
+          <a:scrgbClr r="0" g="0" b="0"/>
+        </a:lnRef>
+        <a:fillRef idx="1">
+          <a:scrgbClr r="0" g="0" b="0"/>
+        </a:fillRef>
+        <a:effectRef idx="0">
+          <a:scrgbClr r="0" g="0" b="0"/>
+        </a:effectRef>
+        <a:fontRef idx="minor">
+          <a:schemeClr val="lt1"/>
+        </a:fontRef>
+      </dsp:style>
+      <dsp:txBody>
+        <a:bodyPr spcFirstLastPara="0" vert="horz" wrap="square" lIns="0" tIns="0" rIns="0" bIns="0" numCol="1" spcCol="1270" anchor="ctr" anchorCtr="0">
+          <a:noAutofit/>
+        </a:bodyPr>
+        <a:lstStyle/>
+        <a:p>
+          <a:pPr marL="0" lvl="0" indent="0" algn="ctr" defTabSz="533400">
+            <a:lnSpc>
+              <a:spcPct val="90000"/>
+            </a:lnSpc>
+            <a:spcBef>
+              <a:spcPct val="0"/>
+            </a:spcBef>
+            <a:spcAft>
+              <a:spcPct val="35000"/>
+            </a:spcAft>
+            <a:buNone/>
+          </a:pPr>
+          <a:endParaRPr lang="en-GB" sz="1200" kern="1200"/>
+        </a:p>
+      </dsp:txBody>
+      <dsp:txXfrm rot="-5400000">
+        <a:off x="993496" y="3678088"/>
+        <a:ext cx="178424" cy="173467"/>
+      </dsp:txXfrm>
+    </dsp:sp>
+    <dsp:sp modelId="{C7A2B9FE-0100-493F-86A4-F4055FFCB6DA}">
+      <dsp:nvSpPr>
+        <dsp:cNvPr id="0" name=""/>
+        <dsp:cNvSpPr/>
+      </dsp:nvSpPr>
+      <dsp:spPr>
+        <a:xfrm>
+          <a:off x="378641" y="3967201"/>
+          <a:ext cx="1408132" cy="660828"/>
+        </a:xfrm>
+        <a:prstGeom prst="roundRect">
+          <a:avLst>
+            <a:gd name="adj" fmla="val 10000"/>
+          </a:avLst>
+        </a:prstGeom>
+        <a:solidFill>
+          <a:srgbClr val="00B0F0"/>
+        </a:solidFill>
+        <a:ln w="12700" cap="flat" cmpd="sng" algn="ctr">
+          <a:solidFill>
+            <a:schemeClr val="lt1">
+              <a:hueOff val="0"/>
+              <a:satOff val="0"/>
+              <a:lumOff val="0"/>
+              <a:alphaOff val="0"/>
+            </a:schemeClr>
+          </a:solidFill>
+          <a:prstDash val="solid"/>
+          <a:miter lim="800000"/>
+        </a:ln>
+        <a:effectLst/>
+      </dsp:spPr>
+      <dsp:style>
+        <a:lnRef idx="2">
+          <a:scrgbClr r="0" g="0" b="0"/>
+        </a:lnRef>
+        <a:fillRef idx="1">
+          <a:scrgbClr r="0" g="0" b="0"/>
+        </a:fillRef>
+        <a:effectRef idx="0">
+          <a:scrgbClr r="0" g="0" b="0"/>
+        </a:effectRef>
+        <a:fontRef idx="minor">
+          <a:schemeClr val="lt1"/>
+        </a:fontRef>
+      </dsp:style>
+      <dsp:txBody>
+        <a:bodyPr spcFirstLastPara="0" vert="horz" wrap="square" lIns="64770" tIns="64770" rIns="64770" bIns="64770" numCol="1" spcCol="1270" anchor="ctr" anchorCtr="0">
+          <a:noAutofit/>
+        </a:bodyPr>
+        <a:lstStyle/>
+        <a:p>
+          <a:pPr marL="0" lvl="0" indent="0" algn="ctr" defTabSz="755650">
+            <a:lnSpc>
+              <a:spcPct val="90000"/>
+            </a:lnSpc>
+            <a:spcBef>
+              <a:spcPct val="0"/>
+            </a:spcBef>
+            <a:spcAft>
+              <a:spcPct val="35000"/>
+            </a:spcAft>
+            <a:buNone/>
+          </a:pPr>
+          <a:r>
+            <a:rPr lang="en-GB" sz="1700" kern="1200" dirty="0"/>
+            <a:t>Model Evaluation</a:t>
+          </a:r>
+        </a:p>
+      </dsp:txBody>
+      <dsp:txXfrm>
+        <a:off x="397996" y="3986556"/>
+        <a:ext cx="1369422" cy="622118"/>
+      </dsp:txXfrm>
+    </dsp:sp>
+    <dsp:sp modelId="{B3358F8A-AF90-4A62-918C-F25C09200E18}">
+      <dsp:nvSpPr>
+        <dsp:cNvPr id="0" name=""/>
+        <dsp:cNvSpPr/>
+      </dsp:nvSpPr>
+      <dsp:spPr>
+        <a:xfrm rot="5400000">
+          <a:off x="958802" y="4644550"/>
+          <a:ext cx="247810" cy="297372"/>
+        </a:xfrm>
+        <a:prstGeom prst="rightArrow">
+          <a:avLst>
+            <a:gd name="adj1" fmla="val 60000"/>
+            <a:gd name="adj2" fmla="val 50000"/>
+          </a:avLst>
+        </a:prstGeom>
+        <a:solidFill>
+          <a:schemeClr val="bg1">
+            <a:lumMod val="85000"/>
+          </a:schemeClr>
+        </a:solidFill>
+        <a:ln>
+          <a:noFill/>
+        </a:ln>
+        <a:effectLst/>
+      </dsp:spPr>
+      <dsp:style>
+        <a:lnRef idx="0">
+          <a:scrgbClr r="0" g="0" b="0"/>
+        </a:lnRef>
+        <a:fillRef idx="1">
+          <a:scrgbClr r="0" g="0" b="0"/>
+        </a:fillRef>
+        <a:effectRef idx="0">
+          <a:scrgbClr r="0" g="0" b="0"/>
+        </a:effectRef>
+        <a:fontRef idx="minor">
+          <a:schemeClr val="lt1"/>
+        </a:fontRef>
+      </dsp:style>
+      <dsp:txBody>
+        <a:bodyPr spcFirstLastPara="0" vert="horz" wrap="square" lIns="0" tIns="0" rIns="0" bIns="0" numCol="1" spcCol="1270" anchor="ctr" anchorCtr="0">
+          <a:noAutofit/>
+        </a:bodyPr>
+        <a:lstStyle/>
+        <a:p>
+          <a:pPr marL="0" lvl="0" indent="0" algn="ctr" defTabSz="533400">
+            <a:lnSpc>
+              <a:spcPct val="90000"/>
+            </a:lnSpc>
+            <a:spcBef>
+              <a:spcPct val="0"/>
+            </a:spcBef>
+            <a:spcAft>
+              <a:spcPct val="35000"/>
+            </a:spcAft>
+            <a:buNone/>
+          </a:pPr>
+          <a:endParaRPr lang="en-GB" sz="1200" kern="1200"/>
+        </a:p>
+      </dsp:txBody>
+      <dsp:txXfrm rot="-5400000">
+        <a:off x="993496" y="4669331"/>
+        <a:ext cx="178424" cy="173467"/>
+      </dsp:txXfrm>
+    </dsp:sp>
+    <dsp:sp modelId="{8EBF03C7-9E1A-4381-A941-82A040BE413B}">
+      <dsp:nvSpPr>
+        <dsp:cNvPr id="0" name=""/>
+        <dsp:cNvSpPr/>
+      </dsp:nvSpPr>
+      <dsp:spPr>
+        <a:xfrm>
+          <a:off x="378641" y="4958444"/>
+          <a:ext cx="1408132" cy="660828"/>
+        </a:xfrm>
+        <a:prstGeom prst="roundRect">
+          <a:avLst>
+            <a:gd name="adj" fmla="val 10000"/>
+          </a:avLst>
+        </a:prstGeom>
+        <a:solidFill>
+          <a:schemeClr val="bg1">
+            <a:lumMod val="85000"/>
+          </a:schemeClr>
+        </a:solidFill>
+        <a:ln w="12700" cap="flat" cmpd="sng" algn="ctr">
+          <a:solidFill>
+            <a:schemeClr val="lt1">
+              <a:hueOff val="0"/>
+              <a:satOff val="0"/>
+              <a:lumOff val="0"/>
+              <a:alphaOff val="0"/>
+            </a:schemeClr>
+          </a:solidFill>
+          <a:prstDash val="solid"/>
+          <a:miter lim="800000"/>
+        </a:ln>
+        <a:effectLst/>
+      </dsp:spPr>
+      <dsp:style>
+        <a:lnRef idx="2">
+          <a:scrgbClr r="0" g="0" b="0"/>
+        </a:lnRef>
+        <a:fillRef idx="1">
+          <a:scrgbClr r="0" g="0" b="0"/>
+        </a:fillRef>
+        <a:effectRef idx="0">
+          <a:scrgbClr r="0" g="0" b="0"/>
+        </a:effectRef>
+        <a:fontRef idx="minor">
+          <a:schemeClr val="lt1"/>
+        </a:fontRef>
+      </dsp:style>
+      <dsp:txBody>
+        <a:bodyPr spcFirstLastPara="0" vert="horz" wrap="square" lIns="64770" tIns="64770" rIns="64770" bIns="64770" numCol="1" spcCol="1270" anchor="ctr" anchorCtr="0">
+          <a:noAutofit/>
+        </a:bodyPr>
+        <a:lstStyle/>
+        <a:p>
+          <a:pPr marL="0" lvl="0" indent="0" algn="ctr" defTabSz="755650">
+            <a:lnSpc>
+              <a:spcPct val="90000"/>
+            </a:lnSpc>
+            <a:spcBef>
+              <a:spcPct val="0"/>
+            </a:spcBef>
+            <a:spcAft>
+              <a:spcPct val="35000"/>
+            </a:spcAft>
+            <a:buNone/>
+          </a:pPr>
+          <a:r>
+            <a:rPr lang="en-GB" sz="1700" kern="1200" dirty="0"/>
+            <a:t>Insights and Deployment</a:t>
+          </a:r>
+        </a:p>
+      </dsp:txBody>
+      <dsp:txXfrm>
+        <a:off x="397996" y="4977799"/>
+        <a:ext cx="1369422" cy="622118"/>
+      </dsp:txXfrm>
+    </dsp:sp>
+  </dsp:spTree>
+</dsp:drawing>
+</file>
+
+<file path=ppt/diagrams/drawing6.xml><?xml version="1.0" encoding="utf-8"?>
+<dsp:drawing xmlns:dgm="http://schemas.openxmlformats.org/drawingml/2006/diagram" xmlns:dsp="http://schemas.microsoft.com/office/drawing/2008/diagram" xmlns:a="http://schemas.openxmlformats.org/drawingml/2006/main">
+  <dsp:spTree>
+    <dsp:nvGrpSpPr>
+      <dsp:cNvPr id="0" name=""/>
+      <dsp:cNvGrpSpPr/>
+    </dsp:nvGrpSpPr>
+    <dsp:grpSpPr/>
+    <dsp:sp modelId="{92A658E6-7CC5-4189-BC1B-77D1C61344F0}">
+      <dsp:nvSpPr>
+        <dsp:cNvPr id="0" name=""/>
+        <dsp:cNvSpPr/>
+      </dsp:nvSpPr>
+      <dsp:spPr>
+        <a:xfrm>
+          <a:off x="378641" y="2230"/>
+          <a:ext cx="1408132" cy="660828"/>
+        </a:xfrm>
+        <a:prstGeom prst="roundRect">
+          <a:avLst>
+            <a:gd name="adj" fmla="val 10000"/>
+          </a:avLst>
+        </a:prstGeom>
+        <a:solidFill>
+          <a:schemeClr val="bg1">
+            <a:lumMod val="85000"/>
+          </a:schemeClr>
+        </a:solidFill>
+        <a:ln w="12700" cap="flat" cmpd="sng" algn="ctr">
+          <a:solidFill>
+            <a:schemeClr val="lt1">
+              <a:hueOff val="0"/>
+              <a:satOff val="0"/>
+              <a:lumOff val="0"/>
+              <a:alphaOff val="0"/>
+            </a:schemeClr>
+          </a:solidFill>
+          <a:prstDash val="solid"/>
+          <a:miter lim="800000"/>
+        </a:ln>
+        <a:effectLst/>
+      </dsp:spPr>
+      <dsp:style>
+        <a:lnRef idx="2">
+          <a:scrgbClr r="0" g="0" b="0"/>
+        </a:lnRef>
+        <a:fillRef idx="1">
+          <a:scrgbClr r="0" g="0" b="0"/>
+        </a:fillRef>
+        <a:effectRef idx="0">
+          <a:scrgbClr r="0" g="0" b="0"/>
+        </a:effectRef>
+        <a:fontRef idx="minor">
+          <a:schemeClr val="lt1"/>
+        </a:fontRef>
+      </dsp:style>
+      <dsp:txBody>
+        <a:bodyPr spcFirstLastPara="0" vert="horz" wrap="square" lIns="64770" tIns="64770" rIns="64770" bIns="64770" numCol="1" spcCol="1270" anchor="ctr" anchorCtr="0">
+          <a:noAutofit/>
+        </a:bodyPr>
+        <a:lstStyle/>
+        <a:p>
+          <a:pPr marL="0" lvl="0" indent="0" algn="ctr" defTabSz="755650">
+            <a:lnSpc>
+              <a:spcPct val="90000"/>
+            </a:lnSpc>
+            <a:spcBef>
+              <a:spcPct val="0"/>
+            </a:spcBef>
+            <a:spcAft>
+              <a:spcPct val="35000"/>
+            </a:spcAft>
+            <a:buNone/>
+          </a:pPr>
+          <a:r>
+            <a:rPr lang="en-GB" sz="1700" kern="1200" dirty="0"/>
+            <a:t>Problem Definition</a:t>
+          </a:r>
+        </a:p>
+      </dsp:txBody>
+      <dsp:txXfrm>
+        <a:off x="397996" y="21585"/>
+        <a:ext cx="1369422" cy="622118"/>
+      </dsp:txXfrm>
+    </dsp:sp>
+    <dsp:sp modelId="{F24AEA42-5A51-4031-B54A-3964F49F5481}">
+      <dsp:nvSpPr>
+        <dsp:cNvPr id="0" name=""/>
+        <dsp:cNvSpPr/>
+      </dsp:nvSpPr>
+      <dsp:spPr>
+        <a:xfrm rot="5400000">
+          <a:off x="958802" y="679579"/>
+          <a:ext cx="247810" cy="297372"/>
+        </a:xfrm>
+        <a:prstGeom prst="rightArrow">
+          <a:avLst>
+            <a:gd name="adj1" fmla="val 60000"/>
+            <a:gd name="adj2" fmla="val 50000"/>
+          </a:avLst>
+        </a:prstGeom>
+        <a:solidFill>
+          <a:schemeClr val="bg1">
+            <a:lumMod val="85000"/>
+          </a:schemeClr>
+        </a:solidFill>
+        <a:ln>
+          <a:noFill/>
+        </a:ln>
+        <a:effectLst/>
+      </dsp:spPr>
+      <dsp:style>
+        <a:lnRef idx="0">
+          <a:scrgbClr r="0" g="0" b="0"/>
+        </a:lnRef>
+        <a:fillRef idx="1">
+          <a:scrgbClr r="0" g="0" b="0"/>
+        </a:fillRef>
+        <a:effectRef idx="0">
+          <a:scrgbClr r="0" g="0" b="0"/>
+        </a:effectRef>
+        <a:fontRef idx="minor">
+          <a:schemeClr val="lt1"/>
+        </a:fontRef>
+      </dsp:style>
+      <dsp:txBody>
+        <a:bodyPr spcFirstLastPara="0" vert="horz" wrap="square" lIns="0" tIns="0" rIns="0" bIns="0" numCol="1" spcCol="1270" anchor="ctr" anchorCtr="0">
+          <a:noAutofit/>
+        </a:bodyPr>
+        <a:lstStyle/>
+        <a:p>
+          <a:pPr marL="0" lvl="0" indent="0" algn="ctr" defTabSz="533400">
+            <a:lnSpc>
+              <a:spcPct val="90000"/>
+            </a:lnSpc>
+            <a:spcBef>
+              <a:spcPct val="0"/>
+            </a:spcBef>
+            <a:spcAft>
+              <a:spcPct val="35000"/>
+            </a:spcAft>
+            <a:buNone/>
+          </a:pPr>
+          <a:endParaRPr lang="en-GB" sz="1200" kern="1200"/>
+        </a:p>
+      </dsp:txBody>
+      <dsp:txXfrm rot="-5400000">
+        <a:off x="993496" y="704360"/>
+        <a:ext cx="178424" cy="173467"/>
+      </dsp:txXfrm>
+    </dsp:sp>
+    <dsp:sp modelId="{64CEAE35-FDEE-44EB-B8E3-C6ADAF48582D}">
+      <dsp:nvSpPr>
+        <dsp:cNvPr id="0" name=""/>
+        <dsp:cNvSpPr/>
+      </dsp:nvSpPr>
+      <dsp:spPr>
+        <a:xfrm>
+          <a:off x="378641" y="993473"/>
+          <a:ext cx="1408132" cy="660828"/>
+        </a:xfrm>
+        <a:prstGeom prst="roundRect">
+          <a:avLst>
+            <a:gd name="adj" fmla="val 10000"/>
+          </a:avLst>
+        </a:prstGeom>
+        <a:solidFill>
+          <a:schemeClr val="bg1">
+            <a:lumMod val="85000"/>
+          </a:schemeClr>
+        </a:solidFill>
+        <a:ln w="12700" cap="flat" cmpd="sng" algn="ctr">
+          <a:solidFill>
+            <a:schemeClr val="lt1">
+              <a:hueOff val="0"/>
+              <a:satOff val="0"/>
+              <a:lumOff val="0"/>
+              <a:alphaOff val="0"/>
+            </a:schemeClr>
+          </a:solidFill>
+          <a:prstDash val="solid"/>
+          <a:miter lim="800000"/>
+        </a:ln>
+        <a:effectLst/>
+      </dsp:spPr>
+      <dsp:style>
+        <a:lnRef idx="2">
+          <a:scrgbClr r="0" g="0" b="0"/>
+        </a:lnRef>
+        <a:fillRef idx="1">
+          <a:scrgbClr r="0" g="0" b="0"/>
+        </a:fillRef>
+        <a:effectRef idx="0">
+          <a:scrgbClr r="0" g="0" b="0"/>
+        </a:effectRef>
+        <a:fontRef idx="minor">
+          <a:schemeClr val="lt1"/>
+        </a:fontRef>
+      </dsp:style>
+      <dsp:txBody>
+        <a:bodyPr spcFirstLastPara="0" vert="horz" wrap="square" lIns="64770" tIns="64770" rIns="64770" bIns="64770" numCol="1" spcCol="1270" anchor="ctr" anchorCtr="0">
+          <a:noAutofit/>
+        </a:bodyPr>
+        <a:lstStyle/>
+        <a:p>
+          <a:pPr marL="0" lvl="0" indent="0" algn="ctr" defTabSz="755650">
+            <a:lnSpc>
+              <a:spcPct val="90000"/>
+            </a:lnSpc>
+            <a:spcBef>
+              <a:spcPct val="0"/>
+            </a:spcBef>
+            <a:spcAft>
+              <a:spcPct val="35000"/>
+            </a:spcAft>
+            <a:buNone/>
+          </a:pPr>
+          <a:r>
+            <a:rPr lang="en-GB" sz="1700" kern="1200" dirty="0"/>
+            <a:t>Data Collection</a:t>
+          </a:r>
+        </a:p>
+      </dsp:txBody>
+      <dsp:txXfrm>
+        <a:off x="397996" y="1012828"/>
+        <a:ext cx="1369422" cy="622118"/>
+      </dsp:txXfrm>
+    </dsp:sp>
+    <dsp:sp modelId="{802FAF77-7556-49F2-955C-77B2602B3E2C}">
+      <dsp:nvSpPr>
+        <dsp:cNvPr id="0" name=""/>
+        <dsp:cNvSpPr/>
+      </dsp:nvSpPr>
+      <dsp:spPr>
+        <a:xfrm rot="5400000">
+          <a:off x="958802" y="1670822"/>
+          <a:ext cx="247810" cy="297372"/>
+        </a:xfrm>
+        <a:prstGeom prst="rightArrow">
+          <a:avLst>
+            <a:gd name="adj1" fmla="val 60000"/>
+            <a:gd name="adj2" fmla="val 50000"/>
+          </a:avLst>
+        </a:prstGeom>
+        <a:solidFill>
+          <a:schemeClr val="bg1">
+            <a:lumMod val="85000"/>
+          </a:schemeClr>
+        </a:solidFill>
+        <a:ln>
+          <a:noFill/>
+        </a:ln>
+        <a:effectLst/>
+      </dsp:spPr>
+      <dsp:style>
+        <a:lnRef idx="0">
+          <a:scrgbClr r="0" g="0" b="0"/>
+        </a:lnRef>
+        <a:fillRef idx="1">
+          <a:scrgbClr r="0" g="0" b="0"/>
+        </a:fillRef>
+        <a:effectRef idx="0">
+          <a:scrgbClr r="0" g="0" b="0"/>
+        </a:effectRef>
+        <a:fontRef idx="minor">
+          <a:schemeClr val="lt1"/>
+        </a:fontRef>
+      </dsp:style>
+      <dsp:txBody>
+        <a:bodyPr spcFirstLastPara="0" vert="horz" wrap="square" lIns="0" tIns="0" rIns="0" bIns="0" numCol="1" spcCol="1270" anchor="ctr" anchorCtr="0">
+          <a:noAutofit/>
+        </a:bodyPr>
+        <a:lstStyle/>
+        <a:p>
+          <a:pPr marL="0" lvl="0" indent="0" algn="ctr" defTabSz="533400">
+            <a:lnSpc>
+              <a:spcPct val="90000"/>
+            </a:lnSpc>
+            <a:spcBef>
+              <a:spcPct val="0"/>
+            </a:spcBef>
+            <a:spcAft>
+              <a:spcPct val="35000"/>
+            </a:spcAft>
+            <a:buNone/>
+          </a:pPr>
+          <a:endParaRPr lang="en-GB" sz="1200" kern="1200"/>
+        </a:p>
+      </dsp:txBody>
+      <dsp:txXfrm rot="-5400000">
+        <a:off x="993496" y="1695603"/>
+        <a:ext cx="178424" cy="173467"/>
+      </dsp:txXfrm>
+    </dsp:sp>
+    <dsp:sp modelId="{DC57E3AD-10C7-4582-B304-DE305EB9090E}">
+      <dsp:nvSpPr>
+        <dsp:cNvPr id="0" name=""/>
+        <dsp:cNvSpPr/>
+      </dsp:nvSpPr>
+      <dsp:spPr>
+        <a:xfrm>
+          <a:off x="378641" y="1984715"/>
+          <a:ext cx="1408132" cy="660828"/>
+        </a:xfrm>
+        <a:prstGeom prst="roundRect">
+          <a:avLst>
+            <a:gd name="adj" fmla="val 10000"/>
+          </a:avLst>
+        </a:prstGeom>
+        <a:solidFill>
+          <a:schemeClr val="bg1">
+            <a:lumMod val="85000"/>
+          </a:schemeClr>
+        </a:solidFill>
+        <a:ln w="12700" cap="flat" cmpd="sng" algn="ctr">
+          <a:solidFill>
+            <a:schemeClr val="lt1">
+              <a:hueOff val="0"/>
+              <a:satOff val="0"/>
+              <a:lumOff val="0"/>
+              <a:alphaOff val="0"/>
+            </a:schemeClr>
+          </a:solidFill>
+          <a:prstDash val="solid"/>
+          <a:miter lim="800000"/>
+        </a:ln>
+        <a:effectLst/>
+      </dsp:spPr>
+      <dsp:style>
+        <a:lnRef idx="2">
+          <a:scrgbClr r="0" g="0" b="0"/>
+        </a:lnRef>
+        <a:fillRef idx="1">
+          <a:scrgbClr r="0" g="0" b="0"/>
+        </a:fillRef>
+        <a:effectRef idx="0">
+          <a:scrgbClr r="0" g="0" b="0"/>
+        </a:effectRef>
+        <a:fontRef idx="minor">
+          <a:schemeClr val="lt1"/>
+        </a:fontRef>
+      </dsp:style>
+      <dsp:txBody>
+        <a:bodyPr spcFirstLastPara="0" vert="horz" wrap="square" lIns="64770" tIns="64770" rIns="64770" bIns="64770" numCol="1" spcCol="1270" anchor="ctr" anchorCtr="0">
+          <a:noAutofit/>
+        </a:bodyPr>
+        <a:lstStyle/>
+        <a:p>
+          <a:pPr marL="0" lvl="0" indent="0" algn="ctr" defTabSz="755650">
+            <a:lnSpc>
+              <a:spcPct val="90000"/>
+            </a:lnSpc>
+            <a:spcBef>
+              <a:spcPct val="0"/>
+            </a:spcBef>
+            <a:spcAft>
+              <a:spcPct val="35000"/>
+            </a:spcAft>
+            <a:buNone/>
+          </a:pPr>
+          <a:r>
+            <a:rPr lang="en-GB" sz="1700" kern="1200" dirty="0"/>
+            <a:t>Data Preparation</a:t>
+          </a:r>
+        </a:p>
+      </dsp:txBody>
+      <dsp:txXfrm>
+        <a:off x="397996" y="2004070"/>
+        <a:ext cx="1369422" cy="622118"/>
+      </dsp:txXfrm>
+    </dsp:sp>
+    <dsp:sp modelId="{FF3CF396-3DCD-47E6-9D68-C4B80479562B}">
+      <dsp:nvSpPr>
+        <dsp:cNvPr id="0" name=""/>
+        <dsp:cNvSpPr/>
+      </dsp:nvSpPr>
+      <dsp:spPr>
+        <a:xfrm rot="5400000">
+          <a:off x="958802" y="2662065"/>
+          <a:ext cx="247810" cy="297372"/>
+        </a:xfrm>
+        <a:prstGeom prst="rightArrow">
+          <a:avLst>
+            <a:gd name="adj1" fmla="val 60000"/>
+            <a:gd name="adj2" fmla="val 50000"/>
+          </a:avLst>
+        </a:prstGeom>
+        <a:solidFill>
+          <a:schemeClr val="bg1">
+            <a:lumMod val="85000"/>
+          </a:schemeClr>
+        </a:solidFill>
+        <a:ln>
+          <a:noFill/>
+        </a:ln>
+        <a:effectLst/>
+      </dsp:spPr>
+      <dsp:style>
+        <a:lnRef idx="0">
+          <a:scrgbClr r="0" g="0" b="0"/>
+        </a:lnRef>
+        <a:fillRef idx="1">
+          <a:scrgbClr r="0" g="0" b="0"/>
+        </a:fillRef>
+        <a:effectRef idx="0">
+          <a:scrgbClr r="0" g="0" b="0"/>
+        </a:effectRef>
+        <a:fontRef idx="minor">
+          <a:schemeClr val="lt1"/>
+        </a:fontRef>
+      </dsp:style>
+      <dsp:txBody>
+        <a:bodyPr spcFirstLastPara="0" vert="horz" wrap="square" lIns="0" tIns="0" rIns="0" bIns="0" numCol="1" spcCol="1270" anchor="ctr" anchorCtr="0">
+          <a:noAutofit/>
+        </a:bodyPr>
+        <a:lstStyle/>
+        <a:p>
+          <a:pPr marL="0" lvl="0" indent="0" algn="ctr" defTabSz="533400">
+            <a:lnSpc>
+              <a:spcPct val="90000"/>
+            </a:lnSpc>
+            <a:spcBef>
+              <a:spcPct val="0"/>
+            </a:spcBef>
+            <a:spcAft>
+              <a:spcPct val="35000"/>
+            </a:spcAft>
+            <a:buNone/>
+          </a:pPr>
+          <a:endParaRPr lang="en-GB" sz="1200" kern="1200"/>
+        </a:p>
+      </dsp:txBody>
+      <dsp:txXfrm rot="-5400000">
+        <a:off x="993496" y="2686846"/>
+        <a:ext cx="178424" cy="173467"/>
+      </dsp:txXfrm>
+    </dsp:sp>
+    <dsp:sp modelId="{36B43830-23D9-4111-86D9-A089E16BC5B7}">
+      <dsp:nvSpPr>
+        <dsp:cNvPr id="0" name=""/>
+        <dsp:cNvSpPr/>
+      </dsp:nvSpPr>
+      <dsp:spPr>
+        <a:xfrm>
+          <a:off x="378641" y="2975958"/>
+          <a:ext cx="1408132" cy="660828"/>
+        </a:xfrm>
+        <a:prstGeom prst="roundRect">
+          <a:avLst>
+            <a:gd name="adj" fmla="val 10000"/>
+          </a:avLst>
+        </a:prstGeom>
+        <a:solidFill>
+          <a:schemeClr val="bg1">
+            <a:lumMod val="85000"/>
+          </a:schemeClr>
+        </a:solidFill>
+        <a:ln w="12700" cap="flat" cmpd="sng" algn="ctr">
+          <a:solidFill>
+            <a:schemeClr val="lt1">
+              <a:hueOff val="0"/>
+              <a:satOff val="0"/>
+              <a:lumOff val="0"/>
+              <a:alphaOff val="0"/>
+            </a:schemeClr>
+          </a:solidFill>
+          <a:prstDash val="solid"/>
+          <a:miter lim="800000"/>
+        </a:ln>
+        <a:effectLst/>
+      </dsp:spPr>
+      <dsp:style>
+        <a:lnRef idx="2">
+          <a:scrgbClr r="0" g="0" b="0"/>
+        </a:lnRef>
+        <a:fillRef idx="1">
+          <a:scrgbClr r="0" g="0" b="0"/>
+        </a:fillRef>
+        <a:effectRef idx="0">
+          <a:scrgbClr r="0" g="0" b="0"/>
+        </a:effectRef>
+        <a:fontRef idx="minor">
+          <a:schemeClr val="lt1"/>
+        </a:fontRef>
+      </dsp:style>
+      <dsp:txBody>
+        <a:bodyPr spcFirstLastPara="0" vert="horz" wrap="square" lIns="64770" tIns="64770" rIns="64770" bIns="64770" numCol="1" spcCol="1270" anchor="ctr" anchorCtr="0">
+          <a:noAutofit/>
+        </a:bodyPr>
+        <a:lstStyle/>
+        <a:p>
+          <a:pPr marL="0" lvl="0" indent="0" algn="ctr" defTabSz="755650">
+            <a:lnSpc>
+              <a:spcPct val="90000"/>
+            </a:lnSpc>
+            <a:spcBef>
+              <a:spcPct val="0"/>
+            </a:spcBef>
+            <a:spcAft>
+              <a:spcPct val="35000"/>
+            </a:spcAft>
+            <a:buNone/>
+          </a:pPr>
+          <a:r>
+            <a:rPr lang="en-GB" sz="1700" kern="1200" dirty="0"/>
+            <a:t>Model Building</a:t>
+          </a:r>
+        </a:p>
+      </dsp:txBody>
+      <dsp:txXfrm>
+        <a:off x="397996" y="2995313"/>
+        <a:ext cx="1369422" cy="622118"/>
+      </dsp:txXfrm>
+    </dsp:sp>
+    <dsp:sp modelId="{9C29D5F3-FB41-442B-A3DC-90C523476856}">
+      <dsp:nvSpPr>
+        <dsp:cNvPr id="0" name=""/>
+        <dsp:cNvSpPr/>
+      </dsp:nvSpPr>
+      <dsp:spPr>
+        <a:xfrm rot="5400000">
+          <a:off x="958802" y="3653307"/>
+          <a:ext cx="247810" cy="297372"/>
+        </a:xfrm>
+        <a:prstGeom prst="rightArrow">
+          <a:avLst>
+            <a:gd name="adj1" fmla="val 60000"/>
+            <a:gd name="adj2" fmla="val 50000"/>
+          </a:avLst>
+        </a:prstGeom>
+        <a:solidFill>
           <a:schemeClr val="bg1">
             <a:lumMod val="85000"/>
           </a:schemeClr>
@@ -9638,9 +11630,7 @@
           </a:avLst>
         </a:prstGeom>
         <a:solidFill>
-          <a:schemeClr val="bg1">
-            <a:lumMod val="85000"/>
-          </a:schemeClr>
+          <a:srgbClr val="00B0F0"/>
         </a:solidFill>
         <a:ln w="12700" cap="flat" cmpd="sng" algn="ctr">
           <a:solidFill>
@@ -10453,6 +12443,155 @@
 </dgm:layoutDef>
 </file>
 
+<file path=ppt/diagrams/layout6.xml><?xml version="1.0" encoding="utf-8"?>
+<dgm:layoutDef xmlns:dgm="http://schemas.openxmlformats.org/drawingml/2006/diagram" xmlns:a="http://schemas.openxmlformats.org/drawingml/2006/main" uniqueId="urn:microsoft.com/office/officeart/2005/8/layout/process2">
+  <dgm:title val=""/>
+  <dgm:desc val=""/>
+  <dgm:catLst>
+    <dgm:cat type="process" pri="13000"/>
+  </dgm:catLst>
+  <dgm:sampData useDef="1">
+    <dgm:dataModel>
+      <dgm:ptLst/>
+      <dgm:bg/>
+      <dgm:whole/>
+    </dgm:dataModel>
+  </dgm:sampData>
+  <dgm:styleData>
+    <dgm:dataModel>
+      <dgm:ptLst>
+        <dgm:pt modelId="0" type="doc"/>
+        <dgm:pt modelId="1"/>
+        <dgm:pt modelId="2"/>
+      </dgm:ptLst>
+      <dgm:cxnLst>
+        <dgm:cxn modelId="3" srcId="0" destId="1" srcOrd="0" destOrd="0"/>
+        <dgm:cxn modelId="4" srcId="0" destId="2" srcOrd="1" destOrd="0"/>
+      </dgm:cxnLst>
+      <dgm:bg/>
+      <dgm:whole/>
+    </dgm:dataModel>
+  </dgm:styleData>
+  <dgm:clrData>
+    <dgm:dataModel>
+      <dgm:ptLst>
+        <dgm:pt modelId="0" type="doc"/>
+        <dgm:pt modelId="1"/>
+        <dgm:pt modelId="2"/>
+        <dgm:pt modelId="3"/>
+        <dgm:pt modelId="4"/>
+      </dgm:ptLst>
+      <dgm:cxnLst>
+        <dgm:cxn modelId="5" srcId="0" destId="1" srcOrd="0" destOrd="0"/>
+        <dgm:cxn modelId="6" srcId="0" destId="2" srcOrd="1" destOrd="0"/>
+        <dgm:cxn modelId="7" srcId="0" destId="3" srcOrd="2" destOrd="0"/>
+        <dgm:cxn modelId="8" srcId="0" destId="4" srcOrd="3" destOrd="0"/>
+      </dgm:cxnLst>
+      <dgm:bg/>
+      <dgm:whole/>
+    </dgm:dataModel>
+  </dgm:clrData>
+  <dgm:layoutNode name="linearFlow">
+    <dgm:varLst>
+      <dgm:resizeHandles val="exact"/>
+    </dgm:varLst>
+    <dgm:alg type="lin">
+      <dgm:param type="linDir" val="fromT"/>
+    </dgm:alg>
+    <dgm:shape xmlns:r="http://schemas.openxmlformats.org/officeDocument/2006/relationships" r:blip="">
+      <dgm:adjLst/>
+    </dgm:shape>
+    <dgm:presOf/>
+    <dgm:constrLst>
+      <dgm:constr type="h" for="ch" ptType="node" refType="h"/>
+      <dgm:constr type="h" for="ch" ptType="sibTrans" refType="h" refFor="ch" refPtType="node" fact="0.5"/>
+      <dgm:constr type="w" for="ch" ptType="node" op="equ"/>
+      <dgm:constr type="primFontSz" for="ch" ptType="node" op="equ" val="65"/>
+      <dgm:constr type="primFontSz" for="des" forName="connectorText" op="equ" val="55"/>
+      <dgm:constr type="primFontSz" for="des" forName="connectorText" refType="primFontSz" refFor="ch" refPtType="node" op="lte" fact="0.8"/>
+    </dgm:constrLst>
+    <dgm:ruleLst/>
+    <dgm:forEach name="nodesForEach" axis="ch" ptType="node">
+      <dgm:layoutNode name="node">
+        <dgm:varLst>
+          <dgm:bulletEnabled val="1"/>
+        </dgm:varLst>
+        <dgm:choose name="Name0">
+          <dgm:if name="Name1" axis="root des" ptType="all node" func="maxDepth" op="gt" val="1">
+            <dgm:alg type="tx">
+              <dgm:param type="parTxLTRAlign" val="l"/>
+              <dgm:param type="parTxRTLAlign" val="r"/>
+              <dgm:param type="txAnchorVertCh" val="mid"/>
+            </dgm:alg>
+          </dgm:if>
+          <dgm:else name="Name2">
+            <dgm:alg type="tx"/>
+          </dgm:else>
+        </dgm:choose>
+        <dgm:shape xmlns:r="http://schemas.openxmlformats.org/officeDocument/2006/relationships" type="roundRect" r:blip="">
+          <dgm:adjLst>
+            <dgm:adj idx="1" val="0.1"/>
+          </dgm:adjLst>
+        </dgm:shape>
+        <dgm:presOf axis="desOrSelf" ptType="node"/>
+        <dgm:constrLst>
+          <dgm:constr type="w" refType="h" fact="1.8"/>
+          <dgm:constr type="tMarg" refType="primFontSz" fact="0.3"/>
+          <dgm:constr type="bMarg" refType="primFontSz" fact="0.3"/>
+          <dgm:constr type="lMarg" refType="primFontSz" fact="0.3"/>
+          <dgm:constr type="rMarg" refType="primFontSz" fact="0.3"/>
+        </dgm:constrLst>
+        <dgm:ruleLst>
+          <dgm:rule type="primFontSz" val="18" fact="NaN" max="NaN"/>
+          <dgm:rule type="w" val="NaN" fact="4" max="NaN"/>
+          <dgm:rule type="primFontSz" val="5" fact="NaN" max="NaN"/>
+        </dgm:ruleLst>
+      </dgm:layoutNode>
+      <dgm:forEach name="sibTransForEach" axis="followSib" ptType="sibTrans" cnt="1">
+        <dgm:layoutNode name="sibTrans">
+          <dgm:alg type="conn">
+            <dgm:param type="begPts" val="auto"/>
+            <dgm:param type="endPts" val="auto"/>
+          </dgm:alg>
+          <dgm:shape xmlns:r="http://schemas.openxmlformats.org/officeDocument/2006/relationships" type="conn" r:blip="">
+            <dgm:adjLst/>
+          </dgm:shape>
+          <dgm:presOf axis="self"/>
+          <dgm:constrLst>
+            <dgm:constr type="w" refType="h" fact="0.9"/>
+            <dgm:constr type="connDist"/>
+            <dgm:constr type="wArH" refType="w" fact="0.5"/>
+            <dgm:constr type="hArH" refType="w"/>
+            <dgm:constr type="stemThick" refType="w" fact="0.6"/>
+            <dgm:constr type="begPad" refType="connDist" fact="0.125"/>
+            <dgm:constr type="endPad" refType="connDist" fact="0.125"/>
+          </dgm:constrLst>
+          <dgm:ruleLst/>
+          <dgm:layoutNode name="connectorText">
+            <dgm:alg type="tx">
+              <dgm:param type="autoTxRot" val="upr"/>
+            </dgm:alg>
+            <dgm:shape xmlns:r="http://schemas.openxmlformats.org/officeDocument/2006/relationships" type="conn" r:blip="" hideGeom="1">
+              <dgm:adjLst/>
+            </dgm:shape>
+            <dgm:presOf axis="self"/>
+            <dgm:constrLst>
+              <dgm:constr type="lMarg"/>
+              <dgm:constr type="rMarg"/>
+              <dgm:constr type="tMarg"/>
+              <dgm:constr type="bMarg"/>
+            </dgm:constrLst>
+            <dgm:ruleLst>
+              <dgm:rule type="primFontSz" val="5" fact="NaN" max="NaN"/>
+            </dgm:ruleLst>
+          </dgm:layoutNode>
+        </dgm:layoutNode>
+      </dgm:forEach>
+    </dgm:forEach>
+  </dgm:layoutNode>
+</dgm:layoutDef>
+</file>
+
 <file path=ppt/diagrams/quickStyle1.xml><?xml version="1.0" encoding="utf-8"?>
 <dgm:styleDef xmlns:dgm="http://schemas.openxmlformats.org/drawingml/2006/diagram" xmlns:a="http://schemas.openxmlformats.org/drawingml/2006/main" uniqueId="urn:microsoft.com/office/officeart/2005/8/quickstyle/simple1">
   <dgm:title val=""/>
@@ -14590,6 +16729,1040 @@
 </file>
 
 <file path=ppt/diagrams/quickStyle5.xml><?xml version="1.0" encoding="utf-8"?>
+<dgm:styleDef xmlns:dgm="http://schemas.openxmlformats.org/drawingml/2006/diagram" xmlns:a="http://schemas.openxmlformats.org/drawingml/2006/main" uniqueId="urn:microsoft.com/office/officeart/2005/8/quickstyle/simple1">
+  <dgm:title val=""/>
+  <dgm:desc val=""/>
+  <dgm:catLst>
+    <dgm:cat type="simple" pri="10100"/>
+  </dgm:catLst>
+  <dgm:scene3d>
+    <a:camera prst="orthographicFront"/>
+    <a:lightRig rig="threePt" dir="t"/>
+  </dgm:scene3d>
+  <dgm:styleLbl name="node0">
+    <dgm:scene3d>
+      <a:camera prst="orthographicFront"/>
+      <a:lightRig rig="threePt" dir="t"/>
+    </dgm:scene3d>
+    <dgm:sp3d/>
+    <dgm:txPr/>
+    <dgm:style>
+      <a:lnRef idx="2">
+        <a:scrgbClr r="0" g="0" b="0"/>
+      </a:lnRef>
+      <a:fillRef idx="1">
+        <a:scrgbClr r="0" g="0" b="0"/>
+      </a:fillRef>
+      <a:effectRef idx="0">
+        <a:scrgbClr r="0" g="0" b="0"/>
+      </a:effectRef>
+      <a:fontRef idx="minor">
+        <a:schemeClr val="lt1"/>
+      </a:fontRef>
+    </dgm:style>
+  </dgm:styleLbl>
+  <dgm:styleLbl name="lnNode1">
+    <dgm:scene3d>
+      <a:camera prst="orthographicFront"/>
+      <a:lightRig rig="threePt" dir="t"/>
+    </dgm:scene3d>
+    <dgm:sp3d/>
+    <dgm:txPr/>
+    <dgm:style>
+      <a:lnRef idx="2">
+        <a:scrgbClr r="0" g="0" b="0"/>
+      </a:lnRef>
+      <a:fillRef idx="1">
+        <a:scrgbClr r="0" g="0" b="0"/>
+      </a:fillRef>
+      <a:effectRef idx="0">
+        <a:scrgbClr r="0" g="0" b="0"/>
+      </a:effectRef>
+      <a:fontRef idx="minor">
+        <a:schemeClr val="lt1"/>
+      </a:fontRef>
+    </dgm:style>
+  </dgm:styleLbl>
+  <dgm:styleLbl name="vennNode1">
+    <dgm:scene3d>
+      <a:camera prst="orthographicFront"/>
+      <a:lightRig rig="threePt" dir="t"/>
+    </dgm:scene3d>
+    <dgm:sp3d/>
+    <dgm:txPr/>
+    <dgm:style>
+      <a:lnRef idx="2">
+        <a:scrgbClr r="0" g="0" b="0"/>
+      </a:lnRef>
+      <a:fillRef idx="1">
+        <a:scrgbClr r="0" g="0" b="0"/>
+      </a:fillRef>
+      <a:effectRef idx="0">
+        <a:scrgbClr r="0" g="0" b="0"/>
+      </a:effectRef>
+      <a:fontRef idx="minor">
+        <a:schemeClr val="tx1"/>
+      </a:fontRef>
+    </dgm:style>
+  </dgm:styleLbl>
+  <dgm:styleLbl name="alignNode1">
+    <dgm:scene3d>
+      <a:camera prst="orthographicFront"/>
+      <a:lightRig rig="threePt" dir="t"/>
+    </dgm:scene3d>
+    <dgm:sp3d/>
+    <dgm:txPr/>
+    <dgm:style>
+      <a:lnRef idx="2">
+        <a:scrgbClr r="0" g="0" b="0"/>
+      </a:lnRef>
+      <a:fillRef idx="1">
+        <a:scrgbClr r="0" g="0" b="0"/>
+      </a:fillRef>
+      <a:effectRef idx="0">
+        <a:scrgbClr r="0" g="0" b="0"/>
+      </a:effectRef>
+      <a:fontRef idx="minor">
+        <a:schemeClr val="lt1"/>
+      </a:fontRef>
+    </dgm:style>
+  </dgm:styleLbl>
+  <dgm:styleLbl name="node1">
+    <dgm:scene3d>
+      <a:camera prst="orthographicFront"/>
+      <a:lightRig rig="threePt" dir="t"/>
+    </dgm:scene3d>
+    <dgm:sp3d/>
+    <dgm:txPr/>
+    <dgm:style>
+      <a:lnRef idx="2">
+        <a:scrgbClr r="0" g="0" b="0"/>
+      </a:lnRef>
+      <a:fillRef idx="1">
+        <a:scrgbClr r="0" g="0" b="0"/>
+      </a:fillRef>
+      <a:effectRef idx="0">
+        <a:scrgbClr r="0" g="0" b="0"/>
+      </a:effectRef>
+      <a:fontRef idx="minor">
+        <a:schemeClr val="lt1"/>
+      </a:fontRef>
+    </dgm:style>
+  </dgm:styleLbl>
+  <dgm:styleLbl name="node2">
+    <dgm:scene3d>
+      <a:camera prst="orthographicFront"/>
+      <a:lightRig rig="threePt" dir="t"/>
+    </dgm:scene3d>
+    <dgm:sp3d/>
+    <dgm:txPr/>
+    <dgm:style>
+      <a:lnRef idx="2">
+        <a:scrgbClr r="0" g="0" b="0"/>
+      </a:lnRef>
+      <a:fillRef idx="1">
+        <a:scrgbClr r="0" g="0" b="0"/>
+      </a:fillRef>
+      <a:effectRef idx="0">
+        <a:scrgbClr r="0" g="0" b="0"/>
+      </a:effectRef>
+      <a:fontRef idx="minor">
+        <a:schemeClr val="lt1"/>
+      </a:fontRef>
+    </dgm:style>
+  </dgm:styleLbl>
+  <dgm:styleLbl name="node3">
+    <dgm:scene3d>
+      <a:camera prst="orthographicFront"/>
+      <a:lightRig rig="threePt" dir="t"/>
+    </dgm:scene3d>
+    <dgm:sp3d/>
+    <dgm:txPr/>
+    <dgm:style>
+      <a:lnRef idx="2">
+        <a:scrgbClr r="0" g="0" b="0"/>
+      </a:lnRef>
+      <a:fillRef idx="1">
+        <a:scrgbClr r="0" g="0" b="0"/>
+      </a:fillRef>
+      <a:effectRef idx="0">
+        <a:scrgbClr r="0" g="0" b="0"/>
+      </a:effectRef>
+      <a:fontRef idx="minor">
+        <a:schemeClr val="lt1"/>
+      </a:fontRef>
+    </dgm:style>
+  </dgm:styleLbl>
+  <dgm:styleLbl name="node4">
+    <dgm:scene3d>
+      <a:camera prst="orthographicFront"/>
+      <a:lightRig rig="threePt" dir="t"/>
+    </dgm:scene3d>
+    <dgm:sp3d/>
+    <dgm:txPr/>
+    <dgm:style>
+      <a:lnRef idx="2">
+        <a:scrgbClr r="0" g="0" b="0"/>
+      </a:lnRef>
+      <a:fillRef idx="1">
+        <a:scrgbClr r="0" g="0" b="0"/>
+      </a:fillRef>
+      <a:effectRef idx="0">
+        <a:scrgbClr r="0" g="0" b="0"/>
+      </a:effectRef>
+      <a:fontRef idx="minor">
+        <a:schemeClr val="lt1"/>
+      </a:fontRef>
+    </dgm:style>
+  </dgm:styleLbl>
+  <dgm:styleLbl name="fgImgPlace1">
+    <dgm:scene3d>
+      <a:camera prst="orthographicFront"/>
+      <a:lightRig rig="threePt" dir="t"/>
+    </dgm:scene3d>
+    <dgm:sp3d/>
+    <dgm:txPr/>
+    <dgm:style>
+      <a:lnRef idx="2">
+        <a:scrgbClr r="0" g="0" b="0"/>
+      </a:lnRef>
+      <a:fillRef idx="1">
+        <a:scrgbClr r="0" g="0" b="0"/>
+      </a:fillRef>
+      <a:effectRef idx="0">
+        <a:scrgbClr r="0" g="0" b="0"/>
+      </a:effectRef>
+      <a:fontRef idx="minor"/>
+    </dgm:style>
+  </dgm:styleLbl>
+  <dgm:styleLbl name="alignImgPlace1">
+    <dgm:scene3d>
+      <a:camera prst="orthographicFront"/>
+      <a:lightRig rig="threePt" dir="t"/>
+    </dgm:scene3d>
+    <dgm:sp3d/>
+    <dgm:txPr/>
+    <dgm:style>
+      <a:lnRef idx="2">
+        <a:scrgbClr r="0" g="0" b="0"/>
+      </a:lnRef>
+      <a:fillRef idx="1">
+        <a:scrgbClr r="0" g="0" b="0"/>
+      </a:fillRef>
+      <a:effectRef idx="0">
+        <a:scrgbClr r="0" g="0" b="0"/>
+      </a:effectRef>
+      <a:fontRef idx="minor"/>
+    </dgm:style>
+  </dgm:styleLbl>
+  <dgm:styleLbl name="bgImgPlace1">
+    <dgm:scene3d>
+      <a:camera prst="orthographicFront"/>
+      <a:lightRig rig="threePt" dir="t"/>
+    </dgm:scene3d>
+    <dgm:sp3d/>
+    <dgm:txPr/>
+    <dgm:style>
+      <a:lnRef idx="2">
+        <a:scrgbClr r="0" g="0" b="0"/>
+      </a:lnRef>
+      <a:fillRef idx="1">
+        <a:scrgbClr r="0" g="0" b="0"/>
+      </a:fillRef>
+      <a:effectRef idx="0">
+        <a:scrgbClr r="0" g="0" b="0"/>
+      </a:effectRef>
+      <a:fontRef idx="minor"/>
+    </dgm:style>
+  </dgm:styleLbl>
+  <dgm:styleLbl name="sibTrans2D1">
+    <dgm:scene3d>
+      <a:camera prst="orthographicFront"/>
+      <a:lightRig rig="threePt" dir="t"/>
+    </dgm:scene3d>
+    <dgm:sp3d/>
+    <dgm:txPr/>
+    <dgm:style>
+      <a:lnRef idx="0">
+        <a:scrgbClr r="0" g="0" b="0"/>
+      </a:lnRef>
+      <a:fillRef idx="1">
+        <a:scrgbClr r="0" g="0" b="0"/>
+      </a:fillRef>
+      <a:effectRef idx="0">
+        <a:scrgbClr r="0" g="0" b="0"/>
+      </a:effectRef>
+      <a:fontRef idx="minor">
+        <a:schemeClr val="lt1"/>
+      </a:fontRef>
+    </dgm:style>
+  </dgm:styleLbl>
+  <dgm:styleLbl name="fgSibTrans2D1">
+    <dgm:scene3d>
+      <a:camera prst="orthographicFront"/>
+      <a:lightRig rig="threePt" dir="t"/>
+    </dgm:scene3d>
+    <dgm:sp3d/>
+    <dgm:txPr/>
+    <dgm:style>
+      <a:lnRef idx="0">
+        <a:scrgbClr r="0" g="0" b="0"/>
+      </a:lnRef>
+      <a:fillRef idx="1">
+        <a:scrgbClr r="0" g="0" b="0"/>
+      </a:fillRef>
+      <a:effectRef idx="0">
+        <a:scrgbClr r="0" g="0" b="0"/>
+      </a:effectRef>
+      <a:fontRef idx="minor">
+        <a:schemeClr val="lt1"/>
+      </a:fontRef>
+    </dgm:style>
+  </dgm:styleLbl>
+  <dgm:styleLbl name="bgSibTrans2D1">
+    <dgm:scene3d>
+      <a:camera prst="orthographicFront"/>
+      <a:lightRig rig="threePt" dir="t"/>
+    </dgm:scene3d>
+    <dgm:sp3d/>
+    <dgm:txPr/>
+    <dgm:style>
+      <a:lnRef idx="0">
+        <a:scrgbClr r="0" g="0" b="0"/>
+      </a:lnRef>
+      <a:fillRef idx="1">
+        <a:scrgbClr r="0" g="0" b="0"/>
+      </a:fillRef>
+      <a:effectRef idx="0">
+        <a:scrgbClr r="0" g="0" b="0"/>
+      </a:effectRef>
+      <a:fontRef idx="minor">
+        <a:schemeClr val="lt1"/>
+      </a:fontRef>
+    </dgm:style>
+  </dgm:styleLbl>
+  <dgm:styleLbl name="sibTrans1D1">
+    <dgm:scene3d>
+      <a:camera prst="orthographicFront"/>
+      <a:lightRig rig="threePt" dir="t"/>
+    </dgm:scene3d>
+    <dgm:sp3d/>
+    <dgm:txPr/>
+    <dgm:style>
+      <a:lnRef idx="1">
+        <a:scrgbClr r="0" g="0" b="0"/>
+      </a:lnRef>
+      <a:fillRef idx="0">
+        <a:scrgbClr r="0" g="0" b="0"/>
+      </a:fillRef>
+      <a:effectRef idx="0">
+        <a:scrgbClr r="0" g="0" b="0"/>
+      </a:effectRef>
+      <a:fontRef idx="minor"/>
+    </dgm:style>
+  </dgm:styleLbl>
+  <dgm:styleLbl name="callout">
+    <dgm:scene3d>
+      <a:camera prst="orthographicFront"/>
+      <a:lightRig rig="threePt" dir="t"/>
+    </dgm:scene3d>
+    <dgm:sp3d/>
+    <dgm:txPr/>
+    <dgm:style>
+      <a:lnRef idx="2">
+        <a:scrgbClr r="0" g="0" b="0"/>
+      </a:lnRef>
+      <a:fillRef idx="1">
+        <a:scrgbClr r="0" g="0" b="0"/>
+      </a:fillRef>
+      <a:effectRef idx="0">
+        <a:scrgbClr r="0" g="0" b="0"/>
+      </a:effectRef>
+      <a:fontRef idx="minor"/>
+    </dgm:style>
+  </dgm:styleLbl>
+  <dgm:styleLbl name="asst0">
+    <dgm:scene3d>
+      <a:camera prst="orthographicFront"/>
+      <a:lightRig rig="threePt" dir="t"/>
+    </dgm:scene3d>
+    <dgm:sp3d/>
+    <dgm:txPr/>
+    <dgm:style>
+      <a:lnRef idx="2">
+        <a:scrgbClr r="0" g="0" b="0"/>
+      </a:lnRef>
+      <a:fillRef idx="1">
+        <a:scrgbClr r="0" g="0" b="0"/>
+      </a:fillRef>
+      <a:effectRef idx="0">
+        <a:scrgbClr r="0" g="0" b="0"/>
+      </a:effectRef>
+      <a:fontRef idx="minor">
+        <a:schemeClr val="lt1"/>
+      </a:fontRef>
+    </dgm:style>
+  </dgm:styleLbl>
+  <dgm:styleLbl name="asst1">
+    <dgm:scene3d>
+      <a:camera prst="orthographicFront"/>
+      <a:lightRig rig="threePt" dir="t"/>
+    </dgm:scene3d>
+    <dgm:sp3d/>
+    <dgm:txPr/>
+    <dgm:style>
+      <a:lnRef idx="2">
+        <a:scrgbClr r="0" g="0" b="0"/>
+      </a:lnRef>
+      <a:fillRef idx="1">
+        <a:scrgbClr r="0" g="0" b="0"/>
+      </a:fillRef>
+      <a:effectRef idx="0">
+        <a:scrgbClr r="0" g="0" b="0"/>
+      </a:effectRef>
+      <a:fontRef idx="minor">
+        <a:schemeClr val="lt1"/>
+      </a:fontRef>
+    </dgm:style>
+  </dgm:styleLbl>
+  <dgm:styleLbl name="asst2">
+    <dgm:scene3d>
+      <a:camera prst="orthographicFront"/>
+      <a:lightRig rig="threePt" dir="t"/>
+    </dgm:scene3d>
+    <dgm:sp3d/>
+    <dgm:txPr/>
+    <dgm:style>
+      <a:lnRef idx="2">
+        <a:scrgbClr r="0" g="0" b="0"/>
+      </a:lnRef>
+      <a:fillRef idx="1">
+        <a:scrgbClr r="0" g="0" b="0"/>
+      </a:fillRef>
+      <a:effectRef idx="0">
+        <a:scrgbClr r="0" g="0" b="0"/>
+      </a:effectRef>
+      <a:fontRef idx="minor">
+        <a:schemeClr val="lt1"/>
+      </a:fontRef>
+    </dgm:style>
+  </dgm:styleLbl>
+  <dgm:styleLbl name="asst3">
+    <dgm:scene3d>
+      <a:camera prst="orthographicFront"/>
+      <a:lightRig rig="threePt" dir="t"/>
+    </dgm:scene3d>
+    <dgm:sp3d/>
+    <dgm:txPr/>
+    <dgm:style>
+      <a:lnRef idx="2">
+        <a:scrgbClr r="0" g="0" b="0"/>
+      </a:lnRef>
+      <a:fillRef idx="1">
+        <a:scrgbClr r="0" g="0" b="0"/>
+      </a:fillRef>
+      <a:effectRef idx="0">
+        <a:scrgbClr r="0" g="0" b="0"/>
+      </a:effectRef>
+      <a:fontRef idx="minor">
+        <a:schemeClr val="lt1"/>
+      </a:fontRef>
+    </dgm:style>
+  </dgm:styleLbl>
+  <dgm:styleLbl name="asst4">
+    <dgm:scene3d>
+      <a:camera prst="orthographicFront"/>
+      <a:lightRig rig="threePt" dir="t"/>
+    </dgm:scene3d>
+    <dgm:sp3d/>
+    <dgm:txPr/>
+    <dgm:style>
+      <a:lnRef idx="2">
+        <a:scrgbClr r="0" g="0" b="0"/>
+      </a:lnRef>
+      <a:fillRef idx="1">
+        <a:scrgbClr r="0" g="0" b="0"/>
+      </a:fillRef>
+      <a:effectRef idx="0">
+        <a:scrgbClr r="0" g="0" b="0"/>
+      </a:effectRef>
+      <a:fontRef idx="minor">
+        <a:schemeClr val="lt1"/>
+      </a:fontRef>
+    </dgm:style>
+  </dgm:styleLbl>
+  <dgm:styleLbl name="parChTrans2D1">
+    <dgm:scene3d>
+      <a:camera prst="orthographicFront"/>
+      <a:lightRig rig="threePt" dir="t"/>
+    </dgm:scene3d>
+    <dgm:sp3d/>
+    <dgm:txPr/>
+    <dgm:style>
+      <a:lnRef idx="2">
+        <a:scrgbClr r="0" g="0" b="0"/>
+      </a:lnRef>
+      <a:fillRef idx="1">
+        <a:scrgbClr r="0" g="0" b="0"/>
+      </a:fillRef>
+      <a:effectRef idx="0">
+        <a:scrgbClr r="0" g="0" b="0"/>
+      </a:effectRef>
+      <a:fontRef idx="minor">
+        <a:schemeClr val="lt1"/>
+      </a:fontRef>
+    </dgm:style>
+  </dgm:styleLbl>
+  <dgm:styleLbl name="parChTrans2D2">
+    <dgm:scene3d>
+      <a:camera prst="orthographicFront"/>
+      <a:lightRig rig="threePt" dir="t"/>
+    </dgm:scene3d>
+    <dgm:sp3d/>
+    <dgm:txPr/>
+    <dgm:style>
+      <a:lnRef idx="2">
+        <a:scrgbClr r="0" g="0" b="0"/>
+      </a:lnRef>
+      <a:fillRef idx="1">
+        <a:scrgbClr r="0" g="0" b="0"/>
+      </a:fillRef>
+      <a:effectRef idx="0">
+        <a:scrgbClr r="0" g="0" b="0"/>
+      </a:effectRef>
+      <a:fontRef idx="minor">
+        <a:schemeClr val="lt1"/>
+      </a:fontRef>
+    </dgm:style>
+  </dgm:styleLbl>
+  <dgm:styleLbl name="parChTrans2D3">
+    <dgm:scene3d>
+      <a:camera prst="orthographicFront"/>
+      <a:lightRig rig="threePt" dir="t"/>
+    </dgm:scene3d>
+    <dgm:sp3d/>
+    <dgm:txPr/>
+    <dgm:style>
+      <a:lnRef idx="2">
+        <a:scrgbClr r="0" g="0" b="0"/>
+      </a:lnRef>
+      <a:fillRef idx="1">
+        <a:scrgbClr r="0" g="0" b="0"/>
+      </a:fillRef>
+      <a:effectRef idx="0">
+        <a:scrgbClr r="0" g="0" b="0"/>
+      </a:effectRef>
+      <a:fontRef idx="minor">
+        <a:schemeClr val="lt1"/>
+      </a:fontRef>
+    </dgm:style>
+  </dgm:styleLbl>
+  <dgm:styleLbl name="parChTrans2D4">
+    <dgm:scene3d>
+      <a:camera prst="orthographicFront"/>
+      <a:lightRig rig="threePt" dir="t"/>
+    </dgm:scene3d>
+    <dgm:sp3d/>
+    <dgm:txPr/>
+    <dgm:style>
+      <a:lnRef idx="2">
+        <a:scrgbClr r="0" g="0" b="0"/>
+      </a:lnRef>
+      <a:fillRef idx="1">
+        <a:scrgbClr r="0" g="0" b="0"/>
+      </a:fillRef>
+      <a:effectRef idx="0">
+        <a:scrgbClr r="0" g="0" b="0"/>
+      </a:effectRef>
+      <a:fontRef idx="minor">
+        <a:schemeClr val="lt1"/>
+      </a:fontRef>
+    </dgm:style>
+  </dgm:styleLbl>
+  <dgm:styleLbl name="parChTrans1D1">
+    <dgm:scene3d>
+      <a:camera prst="orthographicFront"/>
+      <a:lightRig rig="threePt" dir="t"/>
+    </dgm:scene3d>
+    <dgm:sp3d/>
+    <dgm:txPr/>
+    <dgm:style>
+      <a:lnRef idx="2">
+        <a:scrgbClr r="0" g="0" b="0"/>
+      </a:lnRef>
+      <a:fillRef idx="0">
+        <a:scrgbClr r="0" g="0" b="0"/>
+      </a:fillRef>
+      <a:effectRef idx="0">
+        <a:scrgbClr r="0" g="0" b="0"/>
+      </a:effectRef>
+      <a:fontRef idx="minor"/>
+    </dgm:style>
+  </dgm:styleLbl>
+  <dgm:styleLbl name="parChTrans1D2">
+    <dgm:scene3d>
+      <a:camera prst="orthographicFront"/>
+      <a:lightRig rig="threePt" dir="t"/>
+    </dgm:scene3d>
+    <dgm:sp3d/>
+    <dgm:txPr/>
+    <dgm:style>
+      <a:lnRef idx="2">
+        <a:scrgbClr r="0" g="0" b="0"/>
+      </a:lnRef>
+      <a:fillRef idx="0">
+        <a:scrgbClr r="0" g="0" b="0"/>
+      </a:fillRef>
+      <a:effectRef idx="0">
+        <a:scrgbClr r="0" g="0" b="0"/>
+      </a:effectRef>
+      <a:fontRef idx="minor"/>
+    </dgm:style>
+  </dgm:styleLbl>
+  <dgm:styleLbl name="parChTrans1D3">
+    <dgm:scene3d>
+      <a:camera prst="orthographicFront"/>
+      <a:lightRig rig="threePt" dir="t"/>
+    </dgm:scene3d>
+    <dgm:sp3d/>
+    <dgm:txPr/>
+    <dgm:style>
+      <a:lnRef idx="2">
+        <a:scrgbClr r="0" g="0" b="0"/>
+      </a:lnRef>
+      <a:fillRef idx="0">
+        <a:scrgbClr r="0" g="0" b="0"/>
+      </a:fillRef>
+      <a:effectRef idx="0">
+        <a:scrgbClr r="0" g="0" b="0"/>
+      </a:effectRef>
+      <a:fontRef idx="minor"/>
+    </dgm:style>
+  </dgm:styleLbl>
+  <dgm:styleLbl name="parChTrans1D4">
+    <dgm:scene3d>
+      <a:camera prst="orthographicFront"/>
+      <a:lightRig rig="threePt" dir="t"/>
+    </dgm:scene3d>
+    <dgm:sp3d/>
+    <dgm:txPr/>
+    <dgm:style>
+      <a:lnRef idx="2">
+        <a:scrgbClr r="0" g="0" b="0"/>
+      </a:lnRef>
+      <a:fillRef idx="0">
+        <a:scrgbClr r="0" g="0" b="0"/>
+      </a:fillRef>
+      <a:effectRef idx="0">
+        <a:scrgbClr r="0" g="0" b="0"/>
+      </a:effectRef>
+      <a:fontRef idx="minor"/>
+    </dgm:style>
+  </dgm:styleLbl>
+  <dgm:styleLbl name="fgAcc1">
+    <dgm:scene3d>
+      <a:camera prst="orthographicFront"/>
+      <a:lightRig rig="threePt" dir="t"/>
+    </dgm:scene3d>
+    <dgm:sp3d/>
+    <dgm:txPr/>
+    <dgm:style>
+      <a:lnRef idx="2">
+        <a:scrgbClr r="0" g="0" b="0"/>
+      </a:lnRef>
+      <a:fillRef idx="1">
+        <a:scrgbClr r="0" g="0" b="0"/>
+      </a:fillRef>
+      <a:effectRef idx="0">
+        <a:scrgbClr r="0" g="0" b="0"/>
+      </a:effectRef>
+      <a:fontRef idx="minor"/>
+    </dgm:style>
+  </dgm:styleLbl>
+  <dgm:styleLbl name="conFgAcc1">
+    <dgm:scene3d>
+      <a:camera prst="orthographicFront"/>
+      <a:lightRig rig="threePt" dir="t"/>
+    </dgm:scene3d>
+    <dgm:sp3d/>
+    <dgm:txPr/>
+    <dgm:style>
+      <a:lnRef idx="2">
+        <a:scrgbClr r="0" g="0" b="0"/>
+      </a:lnRef>
+      <a:fillRef idx="1">
+        <a:scrgbClr r="0" g="0" b="0"/>
+      </a:fillRef>
+      <a:effectRef idx="0">
+        <a:scrgbClr r="0" g="0" b="0"/>
+      </a:effectRef>
+      <a:fontRef idx="minor"/>
+    </dgm:style>
+  </dgm:styleLbl>
+  <dgm:styleLbl name="alignAcc1">
+    <dgm:scene3d>
+      <a:camera prst="orthographicFront"/>
+      <a:lightRig rig="threePt" dir="t"/>
+    </dgm:scene3d>
+    <dgm:sp3d/>
+    <dgm:txPr/>
+    <dgm:style>
+      <a:lnRef idx="2">
+        <a:scrgbClr r="0" g="0" b="0"/>
+      </a:lnRef>
+      <a:fillRef idx="1">
+        <a:scrgbClr r="0" g="0" b="0"/>
+      </a:fillRef>
+      <a:effectRef idx="0">
+        <a:scrgbClr r="0" g="0" b="0"/>
+      </a:effectRef>
+      <a:fontRef idx="minor"/>
+    </dgm:style>
+  </dgm:styleLbl>
+  <dgm:styleLbl name="trAlignAcc1">
+    <dgm:scene3d>
+      <a:camera prst="orthographicFront"/>
+      <a:lightRig rig="threePt" dir="t"/>
+    </dgm:scene3d>
+    <dgm:sp3d/>
+    <dgm:txPr/>
+    <dgm:style>
+      <a:lnRef idx="1">
+        <a:scrgbClr r="0" g="0" b="0"/>
+      </a:lnRef>
+      <a:fillRef idx="1">
+        <a:scrgbClr r="0" g="0" b="0"/>
+      </a:fillRef>
+      <a:effectRef idx="0">
+        <a:scrgbClr r="0" g="0" b="0"/>
+      </a:effectRef>
+      <a:fontRef idx="minor"/>
+    </dgm:style>
+  </dgm:styleLbl>
+  <dgm:styleLbl name="bgAcc1">
+    <dgm:scene3d>
+      <a:camera prst="orthographicFront"/>
+      <a:lightRig rig="threePt" dir="t"/>
+    </dgm:scene3d>
+    <dgm:sp3d/>
+    <dgm:txPr/>
+    <dgm:style>
+      <a:lnRef idx="2">
+        <a:scrgbClr r="0" g="0" b="0"/>
+      </a:lnRef>
+      <a:fillRef idx="1">
+        <a:scrgbClr r="0" g="0" b="0"/>
+      </a:fillRef>
+      <a:effectRef idx="0">
+        <a:scrgbClr r="0" g="0" b="0"/>
+      </a:effectRef>
+      <a:fontRef idx="minor"/>
+    </dgm:style>
+  </dgm:styleLbl>
+  <dgm:styleLbl name="solidFgAcc1">
+    <dgm:scene3d>
+      <a:camera prst="orthographicFront"/>
+      <a:lightRig rig="threePt" dir="t"/>
+    </dgm:scene3d>
+    <dgm:sp3d/>
+    <dgm:txPr/>
+    <dgm:style>
+      <a:lnRef idx="2">
+        <a:scrgbClr r="0" g="0" b="0"/>
+      </a:lnRef>
+      <a:fillRef idx="1">
+        <a:scrgbClr r="0" g="0" b="0"/>
+      </a:fillRef>
+      <a:effectRef idx="0">
+        <a:scrgbClr r="0" g="0" b="0"/>
+      </a:effectRef>
+      <a:fontRef idx="minor"/>
+    </dgm:style>
+  </dgm:styleLbl>
+  <dgm:styleLbl name="solidAlignAcc1">
+    <dgm:scene3d>
+      <a:camera prst="orthographicFront"/>
+      <a:lightRig rig="threePt" dir="t"/>
+    </dgm:scene3d>
+    <dgm:sp3d/>
+    <dgm:txPr/>
+    <dgm:style>
+      <a:lnRef idx="2">
+        <a:scrgbClr r="0" g="0" b="0"/>
+      </a:lnRef>
+      <a:fillRef idx="1">
+        <a:scrgbClr r="0" g="0" b="0"/>
+      </a:fillRef>
+      <a:effectRef idx="0">
+        <a:scrgbClr r="0" g="0" b="0"/>
+      </a:effectRef>
+      <a:fontRef idx="minor"/>
+    </dgm:style>
+  </dgm:styleLbl>
+  <dgm:styleLbl name="solidBgAcc1">
+    <dgm:scene3d>
+      <a:camera prst="orthographicFront"/>
+      <a:lightRig rig="threePt" dir="t"/>
+    </dgm:scene3d>
+    <dgm:sp3d/>
+    <dgm:txPr/>
+    <dgm:style>
+      <a:lnRef idx="2">
+        <a:scrgbClr r="0" g="0" b="0"/>
+      </a:lnRef>
+      <a:fillRef idx="1">
+        <a:scrgbClr r="0" g="0" b="0"/>
+      </a:fillRef>
+      <a:effectRef idx="0">
+        <a:scrgbClr r="0" g="0" b="0"/>
+      </a:effectRef>
+      <a:fontRef idx="minor"/>
+    </dgm:style>
+  </dgm:styleLbl>
+  <dgm:styleLbl name="fgAccFollowNode1">
+    <dgm:scene3d>
+      <a:camera prst="orthographicFront"/>
+      <a:lightRig rig="threePt" dir="t"/>
+    </dgm:scene3d>
+    <dgm:sp3d/>
+    <dgm:txPr/>
+    <dgm:style>
+      <a:lnRef idx="2">
+        <a:scrgbClr r="0" g="0" b="0"/>
+      </a:lnRef>
+      <a:fillRef idx="1">
+        <a:scrgbClr r="0" g="0" b="0"/>
+      </a:fillRef>
+      <a:effectRef idx="0">
+        <a:scrgbClr r="0" g="0" b="0"/>
+      </a:effectRef>
+      <a:fontRef idx="minor"/>
+    </dgm:style>
+  </dgm:styleLbl>
+  <dgm:styleLbl name="alignAccFollowNode1">
+    <dgm:scene3d>
+      <a:camera prst="orthographicFront"/>
+      <a:lightRig rig="threePt" dir="t"/>
+    </dgm:scene3d>
+    <dgm:sp3d/>
+    <dgm:txPr/>
+    <dgm:style>
+      <a:lnRef idx="2">
+        <a:scrgbClr r="0" g="0" b="0"/>
+      </a:lnRef>
+      <a:fillRef idx="1">
+        <a:scrgbClr r="0" g="0" b="0"/>
+      </a:fillRef>
+      <a:effectRef idx="0">
+        <a:scrgbClr r="0" g="0" b="0"/>
+      </a:effectRef>
+      <a:fontRef idx="minor"/>
+    </dgm:style>
+  </dgm:styleLbl>
+  <dgm:styleLbl name="bgAccFollowNode1">
+    <dgm:scene3d>
+      <a:camera prst="orthographicFront"/>
+      <a:lightRig rig="threePt" dir="t"/>
+    </dgm:scene3d>
+    <dgm:sp3d/>
+    <dgm:txPr/>
+    <dgm:style>
+      <a:lnRef idx="2">
+        <a:scrgbClr r="0" g="0" b="0"/>
+      </a:lnRef>
+      <a:fillRef idx="1">
+        <a:scrgbClr r="0" g="0" b="0"/>
+      </a:fillRef>
+      <a:effectRef idx="0">
+        <a:scrgbClr r="0" g="0" b="0"/>
+      </a:effectRef>
+      <a:fontRef idx="minor"/>
+    </dgm:style>
+  </dgm:styleLbl>
+  <dgm:styleLbl name="fgAcc0">
+    <dgm:scene3d>
+      <a:camera prst="orthographicFront"/>
+      <a:lightRig rig="threePt" dir="t"/>
+    </dgm:scene3d>
+    <dgm:sp3d/>
+    <dgm:txPr/>
+    <dgm:style>
+      <a:lnRef idx="2">
+        <a:scrgbClr r="0" g="0" b="0"/>
+      </a:lnRef>
+      <a:fillRef idx="1">
+        <a:scrgbClr r="0" g="0" b="0"/>
+      </a:fillRef>
+      <a:effectRef idx="0">
+        <a:scrgbClr r="0" g="0" b="0"/>
+      </a:effectRef>
+      <a:fontRef idx="minor"/>
+    </dgm:style>
+  </dgm:styleLbl>
+  <dgm:styleLbl name="fgAcc2">
+    <dgm:scene3d>
+      <a:camera prst="orthographicFront"/>
+      <a:lightRig rig="threePt" dir="t"/>
+    </dgm:scene3d>
+    <dgm:sp3d/>
+    <dgm:txPr/>
+    <dgm:style>
+      <a:lnRef idx="2">
+        <a:scrgbClr r="0" g="0" b="0"/>
+      </a:lnRef>
+      <a:fillRef idx="1">
+        <a:scrgbClr r="0" g="0" b="0"/>
+      </a:fillRef>
+      <a:effectRef idx="0">
+        <a:scrgbClr r="0" g="0" b="0"/>
+      </a:effectRef>
+      <a:fontRef idx="minor"/>
+    </dgm:style>
+  </dgm:styleLbl>
+  <dgm:styleLbl name="fgAcc3">
+    <dgm:scene3d>
+      <a:camera prst="orthographicFront"/>
+      <a:lightRig rig="threePt" dir="t"/>
+    </dgm:scene3d>
+    <dgm:sp3d/>
+    <dgm:txPr/>
+    <dgm:style>
+      <a:lnRef idx="2">
+        <a:scrgbClr r="0" g="0" b="0"/>
+      </a:lnRef>
+      <a:fillRef idx="1">
+        <a:scrgbClr r="0" g="0" b="0"/>
+      </a:fillRef>
+      <a:effectRef idx="0">
+        <a:scrgbClr r="0" g="0" b="0"/>
+      </a:effectRef>
+      <a:fontRef idx="minor"/>
+    </dgm:style>
+  </dgm:styleLbl>
+  <dgm:styleLbl name="fgAcc4">
+    <dgm:scene3d>
+      <a:camera prst="orthographicFront"/>
+      <a:lightRig rig="threePt" dir="t"/>
+    </dgm:scene3d>
+    <dgm:sp3d/>
+    <dgm:txPr/>
+    <dgm:style>
+      <a:lnRef idx="2">
+        <a:scrgbClr r="0" g="0" b="0"/>
+      </a:lnRef>
+      <a:fillRef idx="1">
+        <a:scrgbClr r="0" g="0" b="0"/>
+      </a:fillRef>
+      <a:effectRef idx="0">
+        <a:scrgbClr r="0" g="0" b="0"/>
+      </a:effectRef>
+      <a:fontRef idx="minor"/>
+    </dgm:style>
+  </dgm:styleLbl>
+  <dgm:styleLbl name="bgShp">
+    <dgm:scene3d>
+      <a:camera prst="orthographicFront"/>
+      <a:lightRig rig="threePt" dir="t"/>
+    </dgm:scene3d>
+    <dgm:sp3d/>
+    <dgm:txPr/>
+    <dgm:style>
+      <a:lnRef idx="0">
+        <a:scrgbClr r="0" g="0" b="0"/>
+      </a:lnRef>
+      <a:fillRef idx="1">
+        <a:scrgbClr r="0" g="0" b="0"/>
+      </a:fillRef>
+      <a:effectRef idx="0">
+        <a:scrgbClr r="0" g="0" b="0"/>
+      </a:effectRef>
+      <a:fontRef idx="minor"/>
+    </dgm:style>
+  </dgm:styleLbl>
+  <dgm:styleLbl name="dkBgShp">
+    <dgm:scene3d>
+      <a:camera prst="orthographicFront"/>
+      <a:lightRig rig="threePt" dir="t"/>
+    </dgm:scene3d>
+    <dgm:sp3d/>
+    <dgm:txPr/>
+    <dgm:style>
+      <a:lnRef idx="0">
+        <a:scrgbClr r="0" g="0" b="0"/>
+      </a:lnRef>
+      <a:fillRef idx="1">
+        <a:scrgbClr r="0" g="0" b="0"/>
+      </a:fillRef>
+      <a:effectRef idx="0">
+        <a:scrgbClr r="0" g="0" b="0"/>
+      </a:effectRef>
+      <a:fontRef idx="minor"/>
+    </dgm:style>
+  </dgm:styleLbl>
+  <dgm:styleLbl name="trBgShp">
+    <dgm:scene3d>
+      <a:camera prst="orthographicFront"/>
+      <a:lightRig rig="threePt" dir="t"/>
+    </dgm:scene3d>
+    <dgm:sp3d/>
+    <dgm:txPr/>
+    <dgm:style>
+      <a:lnRef idx="0">
+        <a:scrgbClr r="0" g="0" b="0"/>
+      </a:lnRef>
+      <a:fillRef idx="1">
+        <a:scrgbClr r="0" g="0" b="0"/>
+      </a:fillRef>
+      <a:effectRef idx="0">
+        <a:scrgbClr r="0" g="0" b="0"/>
+      </a:effectRef>
+      <a:fontRef idx="minor"/>
+    </dgm:style>
+  </dgm:styleLbl>
+  <dgm:styleLbl name="fgShp">
+    <dgm:scene3d>
+      <a:camera prst="orthographicFront"/>
+      <a:lightRig rig="threePt" dir="t"/>
+    </dgm:scene3d>
+    <dgm:sp3d/>
+    <dgm:txPr/>
+    <dgm:style>
+      <a:lnRef idx="2">
+        <a:scrgbClr r="0" g="0" b="0"/>
+      </a:lnRef>
+      <a:fillRef idx="1">
+        <a:scrgbClr r="0" g="0" b="0"/>
+      </a:fillRef>
+      <a:effectRef idx="0">
+        <a:scrgbClr r="0" g="0" b="0"/>
+      </a:effectRef>
+      <a:fontRef idx="minor"/>
+    </dgm:style>
+  </dgm:styleLbl>
+  <dgm:styleLbl name="revTx">
+    <dgm:scene3d>
+      <a:camera prst="orthographicFront"/>
+      <a:lightRig rig="threePt" dir="t"/>
+    </dgm:scene3d>
+    <dgm:sp3d/>
+    <dgm:txPr/>
+    <dgm:style>
+      <a:lnRef idx="0">
+        <a:scrgbClr r="0" g="0" b="0"/>
+      </a:lnRef>
+      <a:fillRef idx="0">
+        <a:scrgbClr r="0" g="0" b="0"/>
+      </a:fillRef>
+      <a:effectRef idx="0">
+        <a:scrgbClr r="0" g="0" b="0"/>
+      </a:effectRef>
+      <a:fontRef idx="minor"/>
+    </dgm:style>
+  </dgm:styleLbl>
+</dgm:styleDef>
+</file>
+
+<file path=ppt/diagrams/quickStyle6.xml><?xml version="1.0" encoding="utf-8"?>
 <dgm:styleDef xmlns:dgm="http://schemas.openxmlformats.org/drawingml/2006/diagram" xmlns:a="http://schemas.openxmlformats.org/drawingml/2006/main" uniqueId="urn:microsoft.com/office/officeart/2005/8/quickstyle/simple1">
   <dgm:title val=""/>
   <dgm:desc val=""/>
@@ -15705,7 +18878,7 @@
           <a:p>
             <a:fld id="{5D29FC18-0C11-4217-9D91-CB6E5237E831}" type="datetimeFigureOut">
               <a:rPr lang="en-GB" smtClean="0"/>
-              <a:t>23/06/2020</a:t>
+              <a:t>27/06/2020</a:t>
             </a:fld>
             <a:endParaRPr lang="en-GB"/>
           </a:p>
@@ -16136,7 +19309,7 @@
           <a:p>
             <a:fld id="{D4A213A3-10E9-421F-81BE-56E0786AB515}" type="datetime2">
               <a:rPr lang="en-US" smtClean="0"/>
-              <a:t>Tuesday, June 23, 2020</a:t>
+              <a:t>Saturday, June 27, 2020</a:t>
             </a:fld>
             <a:endParaRPr lang="en-US"/>
           </a:p>
@@ -16334,7 +19507,7 @@
           <a:p>
             <a:fld id="{3D5DABC0-2199-478F-BA77-33A651B6CB89}" type="datetime2">
               <a:rPr lang="en-US" smtClean="0"/>
-              <a:t>Tuesday, June 23, 2020</a:t>
+              <a:t>Saturday, June 27, 2020</a:t>
             </a:fld>
             <a:endParaRPr lang="en-US"/>
           </a:p>
@@ -16543,7 +19716,7 @@
           <a:p>
             <a:fld id="{D72230C6-DF61-47F4-B8C5-1B70E884BF06}" type="datetime2">
               <a:rPr lang="en-US" smtClean="0"/>
-              <a:t>Tuesday, June 23, 2020</a:t>
+              <a:t>Saturday, June 27, 2020</a:t>
             </a:fld>
             <a:endParaRPr lang="en-US"/>
           </a:p>
@@ -16753,7 +19926,7 @@
           <a:p>
             <a:fld id="{6B12B50C-7EEE-46CD-BAF7-BBC4026D959A}" type="datetime2">
               <a:rPr lang="en-US" smtClean="0"/>
-              <a:t>Tuesday, June 23, 2020</a:t>
+              <a:t>Saturday, June 27, 2020</a:t>
             </a:fld>
             <a:endParaRPr lang="en-US"/>
           </a:p>
@@ -17033,7 +20206,7 @@
           <a:p>
             <a:fld id="{8D4211C4-AE09-4254-A5E3-6DA9B099C971}" type="datetime2">
               <a:rPr lang="en-US" smtClean="0"/>
-              <a:t>Tuesday, June 23, 2020</a:t>
+              <a:t>Saturday, June 27, 2020</a:t>
             </a:fld>
             <a:endParaRPr lang="en-US"/>
           </a:p>
@@ -17312,7 +20485,7 @@
           <a:p>
             <a:fld id="{681742C3-E082-4760-93B2-E209268DD00C}" type="datetime2">
               <a:rPr lang="en-US" smtClean="0"/>
-              <a:t>Tuesday, June 23, 2020</a:t>
+              <a:t>Saturday, June 27, 2020</a:t>
             </a:fld>
             <a:endParaRPr lang="en-US"/>
           </a:p>
@@ -17733,7 +20906,7 @@
           <a:p>
             <a:fld id="{3B6FC950-F824-48B9-B984-CAEE265865E5}" type="datetime2">
               <a:rPr lang="en-US" smtClean="0"/>
-              <a:t>Tuesday, June 23, 2020</a:t>
+              <a:t>Saturday, June 27, 2020</a:t>
             </a:fld>
             <a:endParaRPr lang="en-US"/>
           </a:p>
@@ -17886,7 +21059,7 @@
           <a:p>
             <a:fld id="{BC8E3A0F-68E7-4D17-BB84-ED1BA4F6AC6B}" type="datetime2">
               <a:rPr lang="en-US" smtClean="0"/>
-              <a:t>Tuesday, June 23, 2020</a:t>
+              <a:t>Saturday, June 27, 2020</a:t>
             </a:fld>
             <a:endParaRPr lang="en-US"/>
           </a:p>
@@ -17999,7 +21172,7 @@
           <a:p>
             <a:fld id="{EDB7BC4F-EDA1-4BA2-BFF3-FE5B31CCB58B}" type="datetime2">
               <a:rPr lang="en-US" smtClean="0"/>
-              <a:t>Tuesday, June 23, 2020</a:t>
+              <a:t>Saturday, June 27, 2020</a:t>
             </a:fld>
             <a:endParaRPr lang="en-US"/>
           </a:p>
@@ -18313,7 +21486,7 @@
           <a:p>
             <a:fld id="{3AAE694C-1394-4838-A564-7380835C2E77}" type="datetime2">
               <a:rPr lang="en-US" smtClean="0"/>
-              <a:t>Tuesday, June 23, 2020</a:t>
+              <a:t>Saturday, June 27, 2020</a:t>
             </a:fld>
             <a:endParaRPr lang="en-US"/>
           </a:p>
@@ -18606,7 +21779,7 @@
           <a:p>
             <a:fld id="{CAB84B19-1A00-4EDB-8425-E1827A377364}" type="datetime2">
               <a:rPr lang="en-US" smtClean="0"/>
-              <a:t>Tuesday, June 23, 2020</a:t>
+              <a:t>Saturday, June 27, 2020</a:t>
             </a:fld>
             <a:endParaRPr lang="en-US"/>
           </a:p>
@@ -18975,7 +22148,7 @@
           <a:p>
             <a:fld id="{10076A27-8146-4F75-9851-A83577C6FD8A}" type="datetime2">
               <a:rPr lang="en-US" smtClean="0"/>
-              <a:t>Tuesday, June 23, 2020</a:t>
+              <a:t>Saturday, June 27, 2020</a:t>
             </a:fld>
             <a:endParaRPr lang="en-US"/>
           </a:p>
@@ -19711,6 +22884,264 @@
     <p:extLst>
       <p:ext uri="{BB962C8B-B14F-4D97-AF65-F5344CB8AC3E}">
         <p14:creationId xmlns:p14="http://schemas.microsoft.com/office/powerpoint/2010/main" val="1048702093"/>
+      </p:ext>
+    </p:extLst>
+  </p:cSld>
+  <p:clrMapOvr>
+    <a:masterClrMapping/>
+  </p:clrMapOvr>
+</p:sld>
+</file>
+
+<file path=ppt/slides/slide10.xml><?xml version="1.0" encoding="utf-8"?>
+<p:sld xmlns:a="http://schemas.openxmlformats.org/drawingml/2006/main" xmlns:r="http://schemas.openxmlformats.org/officeDocument/2006/relationships" xmlns:p="http://schemas.openxmlformats.org/presentationml/2006/main">
+  <p:cSld>
+    <p:spTree>
+      <p:nvGrpSpPr>
+        <p:cNvPr id="1" name=""/>
+        <p:cNvGrpSpPr/>
+        <p:nvPr/>
+      </p:nvGrpSpPr>
+      <p:grpSpPr>
+        <a:xfrm>
+          <a:off x="0" y="0"/>
+          <a:ext cx="0" cy="0"/>
+          <a:chOff x="0" y="0"/>
+          <a:chExt cx="0" cy="0"/>
+        </a:xfrm>
+      </p:grpSpPr>
+      <p:sp>
+        <p:nvSpPr>
+          <p:cNvPr id="2" name="Title 1">
+            <a:extLst>
+              <a:ext uri="{FF2B5EF4-FFF2-40B4-BE49-F238E27FC236}">
+                <a16:creationId xmlns:a16="http://schemas.microsoft.com/office/drawing/2014/main" id="{F0259EA7-E499-401A-85BA-AD76CD847FF1}"/>
+              </a:ext>
+            </a:extLst>
+          </p:cNvPr>
+          <p:cNvSpPr>
+            <a:spLocks noGrp="1"/>
+          </p:cNvSpPr>
+          <p:nvPr>
+            <p:ph type="title"/>
+          </p:nvPr>
+        </p:nvSpPr>
+        <p:spPr/>
+        <p:txBody>
+          <a:bodyPr/>
+          <a:lstStyle/>
+          <a:p>
+            <a:r>
+              <a:rPr lang="en-GB" dirty="0"/>
+              <a:t>Insights &amp; Deployment</a:t>
+            </a:r>
+          </a:p>
+        </p:txBody>
+      </p:sp>
+      <p:sp>
+        <p:nvSpPr>
+          <p:cNvPr id="3" name="Content Placeholder 2">
+            <a:extLst>
+              <a:ext uri="{FF2B5EF4-FFF2-40B4-BE49-F238E27FC236}">
+                <a16:creationId xmlns:a16="http://schemas.microsoft.com/office/drawing/2014/main" id="{E28A6A0B-4199-4A37-ABCF-4171B03107BF}"/>
+              </a:ext>
+            </a:extLst>
+          </p:cNvPr>
+          <p:cNvSpPr>
+            <a:spLocks noGrp="1"/>
+          </p:cNvSpPr>
+          <p:nvPr>
+            <p:ph idx="1"/>
+          </p:nvPr>
+        </p:nvSpPr>
+        <p:spPr/>
+        <p:txBody>
+          <a:bodyPr/>
+          <a:lstStyle/>
+          <a:p>
+            <a:r>
+              <a:rPr lang="en-GB" dirty="0"/>
+              <a:t>In order to allow </a:t>
+            </a:r>
+            <a:r>
+              <a:rPr lang="en-GB" b="1" dirty="0"/>
+              <a:t>inference </a:t>
+            </a:r>
+            <a:r>
+              <a:rPr lang="en-GB" dirty="0"/>
+              <a:t>to be made against our model, we need</a:t>
+            </a:r>
+            <a:br>
+              <a:rPr lang="en-GB" dirty="0"/>
+            </a:br>
+            <a:r>
+              <a:rPr lang="en-GB" dirty="0"/>
+              <a:t>to </a:t>
+            </a:r>
+            <a:r>
+              <a:rPr lang="en-GB" b="1" dirty="0"/>
+              <a:t>deploy </a:t>
+            </a:r>
+            <a:r>
+              <a:rPr lang="en-GB" dirty="0"/>
+              <a:t>it</a:t>
+            </a:r>
+          </a:p>
+          <a:p>
+            <a:r>
+              <a:rPr lang="en-GB" dirty="0"/>
+              <a:t>In many cases, you may also need to find yourself </a:t>
+            </a:r>
+            <a:r>
+              <a:rPr lang="en-GB" b="1" dirty="0"/>
+              <a:t>presenting findings</a:t>
+            </a:r>
+            <a:br>
+              <a:rPr lang="en-GB" dirty="0"/>
+            </a:br>
+            <a:r>
+              <a:rPr lang="en-GB" dirty="0"/>
+              <a:t>from your model/of your results</a:t>
+            </a:r>
+          </a:p>
+          <a:p>
+            <a:pPr lvl="1"/>
+            <a:r>
+              <a:rPr lang="en-GB" dirty="0"/>
+              <a:t>Visualisations, recommendations, actionable decisions etc.</a:t>
+            </a:r>
+          </a:p>
+        </p:txBody>
+      </p:sp>
+      <p:graphicFrame>
+        <p:nvGraphicFramePr>
+          <p:cNvPr id="4" name="Content Placeholder 4">
+            <a:extLst>
+              <a:ext uri="{FF2B5EF4-FFF2-40B4-BE49-F238E27FC236}">
+                <a16:creationId xmlns:a16="http://schemas.microsoft.com/office/drawing/2014/main" id="{BF2B1FAB-C771-4FD6-9153-182A96CE0D55}"/>
+              </a:ext>
+            </a:extLst>
+          </p:cNvPr>
+          <p:cNvGraphicFramePr>
+            <a:graphicFrameLocks/>
+          </p:cNvGraphicFramePr>
+          <p:nvPr>
+            <p:extLst>
+              <p:ext uri="{D42A27DB-BD31-4B8C-83A1-F6EECF244321}">
+                <p14:modId xmlns:p14="http://schemas.microsoft.com/office/powerpoint/2010/main" val="2673467952"/>
+              </p:ext>
+            </p:extLst>
+          </p:nvPr>
+        </p:nvGraphicFramePr>
+        <p:xfrm>
+          <a:off x="9447087" y="443417"/>
+          <a:ext cx="2165416" cy="5621503"/>
+        </p:xfrm>
+        <a:graphic>
+          <a:graphicData uri="http://schemas.openxmlformats.org/drawingml/2006/diagram">
+            <dgm:relIds xmlns:dgm="http://schemas.openxmlformats.org/drawingml/2006/diagram" xmlns:r="http://schemas.openxmlformats.org/officeDocument/2006/relationships" r:dm="rId2" r:lo="rId3" r:qs="rId4" r:cs="rId5"/>
+          </a:graphicData>
+        </a:graphic>
+      </p:graphicFrame>
+    </p:spTree>
+    <p:extLst>
+      <p:ext uri="{BB962C8B-B14F-4D97-AF65-F5344CB8AC3E}">
+        <p14:creationId xmlns:p14="http://schemas.microsoft.com/office/powerpoint/2010/main" val="2558408282"/>
+      </p:ext>
+    </p:extLst>
+  </p:cSld>
+  <p:clrMapOvr>
+    <a:masterClrMapping/>
+  </p:clrMapOvr>
+</p:sld>
+</file>
+
+<file path=ppt/slides/slide11.xml><?xml version="1.0" encoding="utf-8"?>
+<p:sld xmlns:a="http://schemas.openxmlformats.org/drawingml/2006/main" xmlns:r="http://schemas.openxmlformats.org/officeDocument/2006/relationships" xmlns:p="http://schemas.openxmlformats.org/presentationml/2006/main">
+  <p:cSld>
+    <p:spTree>
+      <p:nvGrpSpPr>
+        <p:cNvPr id="1" name=""/>
+        <p:cNvGrpSpPr/>
+        <p:nvPr/>
+      </p:nvGrpSpPr>
+      <p:grpSpPr>
+        <a:xfrm>
+          <a:off x="0" y="0"/>
+          <a:ext cx="0" cy="0"/>
+          <a:chOff x="0" y="0"/>
+          <a:chExt cx="0" cy="0"/>
+        </a:xfrm>
+      </p:grpSpPr>
+      <p:sp>
+        <p:nvSpPr>
+          <p:cNvPr id="2" name="Title 1">
+            <a:extLst>
+              <a:ext uri="{FF2B5EF4-FFF2-40B4-BE49-F238E27FC236}">
+                <a16:creationId xmlns:a16="http://schemas.microsoft.com/office/drawing/2014/main" id="{23D91B93-1FBC-4AB2-8435-939415B0DD9D}"/>
+              </a:ext>
+            </a:extLst>
+          </p:cNvPr>
+          <p:cNvSpPr>
+            <a:spLocks noGrp="1"/>
+          </p:cNvSpPr>
+          <p:nvPr>
+            <p:ph type="title"/>
+          </p:nvPr>
+        </p:nvSpPr>
+        <p:spPr/>
+        <p:txBody>
+          <a:bodyPr/>
+          <a:lstStyle/>
+          <a:p>
+            <a:r>
+              <a:rPr lang="en-GB" dirty="0"/>
+              <a:t>In this Chapter</a:t>
+            </a:r>
+          </a:p>
+        </p:txBody>
+      </p:sp>
+      <p:sp>
+        <p:nvSpPr>
+          <p:cNvPr id="3" name="Content Placeholder 2">
+            <a:extLst>
+              <a:ext uri="{FF2B5EF4-FFF2-40B4-BE49-F238E27FC236}">
+                <a16:creationId xmlns:a16="http://schemas.microsoft.com/office/drawing/2014/main" id="{B7110406-2015-4F2B-BAFB-AFCEAE9732EC}"/>
+              </a:ext>
+            </a:extLst>
+          </p:cNvPr>
+          <p:cNvSpPr>
+            <a:spLocks noGrp="1"/>
+          </p:cNvSpPr>
+          <p:nvPr>
+            <p:ph idx="1"/>
+          </p:nvPr>
+        </p:nvSpPr>
+        <p:spPr/>
+        <p:txBody>
+          <a:bodyPr/>
+          <a:lstStyle/>
+          <a:p>
+            <a:r>
+              <a:rPr lang="en-GB" dirty="0"/>
+              <a:t>We will cover all the steps of the Data Science pipeline</a:t>
+            </a:r>
+          </a:p>
+          <a:p>
+            <a:r>
+              <a:rPr lang="en-GB" dirty="0"/>
+              <a:t>We will work with multiple different datasets to expose you to different kinds of challenges and problems</a:t>
+            </a:r>
+          </a:p>
+          <a:p>
+            <a:endParaRPr lang="en-GB" dirty="0"/>
+          </a:p>
+        </p:txBody>
+      </p:sp>
+    </p:spTree>
+    <p:extLst>
+      <p:ext uri="{BB962C8B-B14F-4D97-AF65-F5344CB8AC3E}">
+        <p14:creationId xmlns:p14="http://schemas.microsoft.com/office/powerpoint/2010/main" val="3337255455"/>
       </p:ext>
     </p:extLst>
   </p:cSld>
@@ -21186,6 +24617,27 @@
               <a:t>cyclical process with model evaluation</a:t>
             </a:r>
           </a:p>
+          <a:p>
+            <a:pPr lvl="1"/>
+            <a:r>
+              <a:rPr lang="en-GB" dirty="0"/>
+              <a:t>Assess the model against our split datasets</a:t>
+            </a:r>
+          </a:p>
+          <a:p>
+            <a:pPr lvl="1"/>
+            <a:r>
+              <a:rPr lang="en-GB" dirty="0"/>
+              <a:t>We should test multiple variants, and pick the one which </a:t>
+            </a:r>
+            <a:br>
+              <a:rPr lang="en-GB" dirty="0"/>
+            </a:br>
+            <a:r>
+              <a:rPr lang="en-GB" dirty="0"/>
+              <a:t>maximises evaluation</a:t>
+            </a:r>
+          </a:p>
         </p:txBody>
       </p:sp>
       <p:graphicFrame>
@@ -21203,7 +24655,7 @@
           <p:nvPr>
             <p:extLst>
               <p:ext uri="{D42A27DB-BD31-4B8C-83A1-F6EECF244321}">
-                <p14:modId xmlns:p14="http://schemas.microsoft.com/office/powerpoint/2010/main" val="2997336221"/>
+                <p14:modId xmlns:p14="http://schemas.microsoft.com/office/powerpoint/2010/main" val="1675244949"/>
               </p:ext>
             </p:extLst>
           </p:nvPr>

</xml_diff>